<commit_message>
Fix theoretical compilation errors in Refactoring example code
</commit_message>
<xml_diff>
--- a/06_refactoring/refactoring_slides.pptx
+++ b/06_refactoring/refactoring_slides.pptx
@@ -233,7 +233,7 @@
   <inkml:trace contextRef="#ctx0" brushRef="#br0" timeOffset="-5735.8791">3517 2123 11877,'0'0'2498,"0"0"-2322,0 0 368,0 0-240,0 0 464,0 0 225,0 0-305,22 31-64,-15-22 1,0 3-129,5-1-80,-12 4-96,14 0-48,-7 3-31,1-2-145,-1 0-32,0 0 16,0-1-48,0 1-16,0 1 16,-5-4-16,6 0-16,-4 0 16,-1-3 0,1-3-32,-4 0-128,3-2-289,-3-1-255,5-2-480,-5 1-817,0-3-1041,0 0-4769</inkml:trace>
   <inkml:trace contextRef="#ctx0" brushRef="#br0" timeOffset="-4432.6546">3524 2069 9989,'0'0'3473,"0"0"-3393,0 0 721,0 0-225,0 0 688,0 0 17,41 20-545,-34-15-159,7 1-177,-6-1-224,6-1-16,0-1-80,-5 1-64,3 0 64,3-2-80,4 0-496,-12-2-1041,0 0-1937,-7 0-6386</inkml:trace>
   <inkml:trace contextRef="#ctx0" brushRef="#br0" timeOffset="-1957.7772">3217 3009 4178,'0'0'2801,"0"0"-2641,0 0-16,0 0 721,0 0 335,0 0-671,0 0-209,7 19-48,-5-15 224,4-1 128,-4 1 49,-2 0-17,9-1-192,-9-1-256,0 3-208,0-2 0,0-1 48,0 1 304,0 0 305,0 1-273,-11-3-384,3-1-256,1 0-272,0 0-289,2-5-1024,3-3 977,2-2 208,0-1 544,0 2 224,0 1-48,2 2 144,3 4 64,-2 2-16,-3 0-256,0 0-336,0 0 16,0 0 320,0 0 32,0 0-32,0 0-3954</inkml:trace>
-  <inkml:trace contextRef="#ctx0" brushRef="#br1" timeOffset="-35425.2316">623 2097 15847,'0'0'0,"0"0"-672,0 0 544,0 0 32,0 0-608,0 0-273,-7 32 177,28-44 800,10-3 1120,7 0-880,-2 5 0,-8 5-128,6 5-112,-13 0-256,-6 0-320,-1 5 48,0 2 528,1-2 48,-6 0 80,8-2-96,-3-1-32,0-2 80,-6 0-80,6 0 0,0 0 0,0 3-80,-4 4 80,7 0-80,-3 2 80,0 1 208,7 1 96,1-5-208,11-3 16,3-3-32,2 0-64,7 0-32,-2-7-144,-36 2-1248,3 2-2178</inkml:trace>
+  <inkml:trace contextRef="#ctx0" brushRef="#br1" timeOffset="-35425.2315">623 2097 15847,'0'0'0,"0"0"-672,0 0 544,0 0 32,0 0-608,0 0-273,-7 32 177,28-44 800,10-3 1120,7 0-880,-2 5 0,-8 5-128,6 5-112,-13 0-256,-6 0-320,-1 5 48,0 2 528,1-2 48,-6 0 80,8-2-96,-3-1-32,0-2 80,-6 0-80,6 0 0,0 0 0,0 3-80,-4 4 80,7 0-80,-3 2 80,0 1 208,7 1 96,1-5-208,11-3 16,3-3-32,2 0-64,7 0-32,-2-7-144,-36 2-1248,3 2-2178</inkml:trace>
   <inkml:trace contextRef="#ctx0" brushRef="#br1" timeOffset="-32382.7988">4817 2237 16247,'0'0'0,"0"0"-1728,0 0 1424,0 0 304,0 0 752,101 9-112,-49-21 145,-7-2-737,0 3 656,-9 3-320,-15 5-304,1 1-80,-3 2 0,-12 0-16,7 0-112,-7 0 208,8 0-80,-1 0 0,-4 0-240,11 0-336,3 0-593,-17 0-1760,0 0-2530</inkml:trace>
 </inkml:ink>
 </file>
@@ -270,13 +270,13 @@
   <inkml:trace contextRef="#ctx0" brushRef="#br0">4401 756 9780,'0'0'1889,"0"0"-1873,0 0 321,0 0-337,0 0 112,0 0-64,0 0 176,0-10 0,6 5 16,-6-2 352,5-2-288,1-3-272,2-4-32,3 2-176,1-2-224,1 1 336,-2 5-272,-5 0 336,0 8 160,-6 0-112,0 2-48,0 0-32,0 0 32,0 0-16,0 2-256,0 4 272,0 0 400,6-2-48,-1-2-144,1-2-208,6 0-288,-1 0-832,2-8 303,6 0 209,-7 0-128,-6 2 688,-1 4 48,-3 0 144,-2 2-144,0 0 0,0 0 0,0 0-64,0 0 128,0 3 496,0-2-80,4 1-256,1-2-96,1 0-128,2 0-768,3-8 368,8-2 288,-2 0-1729,-3 1 64,3 3 1265,-2 0-64,-3 4 480,3 0 96,-9 2 0,-1 0-113,-5 0 113,6 0 593,-6 0 671,0 0 305,0 0 224,0 0-721,0 0-784,0 0-207,6 0 239,5-2-96,2-4-224,8 0-737,6-4 225,-8 0-336,4 1 800,2 4-560,-14 0-321,1 3-143,-12 2 863,0 0 65,0 0 144,0 0 1297,0 0 192,0 2-577,0 3-47,0-2-257,0-1-160,0 0-448,0-2-256,5 0-2433,1 0 368,0 0-5011</inkml:trace>
   <inkml:trace contextRef="#ctx0" brushRef="#br0" timeOffset="-23157.7724">3372 1160 528,'0'0'9060,"0"0"-8836,0 0-127,0 0 703,0 0 208,0 0-127,0 0-289,6 2 16,-6-2-111,0 0-1,0 0 160,0 0-32,0 0-31,0 0 15,0 0-32,0 0-480,6 2 16,-6-1 144,6 2-16,-1-2-79,1 2 63,2-3-160,1 2 48,-1-2-16,5 2-16,-7-2-32,5 0 16,-5 0-32,-1 0-16,1 0 16,2 0 0,-2 0 16,3 0 0,3-7 0,-1 3-16,4-2-32,-9 1 16,5-1-16,-5 2-16,2-1 0,1 1 0,-3-2 0,2 0 16,-3 0-32,5 0 16,-1-2-48,-3 2 64,0 0 0,5 0-16,-5-2 16,-1 3 0,1-2 0,0 0-32,0 3 32,-1-2 0,3 2-16,-2-4 16,7 2 0,-7 0-16,5 0 16,-5-1 16,5-1-16,-5 0 0,6 2 0,-5-2 0,3 2 0,-3 0 0,7-2-32,-9 0 32,7 1-32,-1-3 0,-3 4 32,2-2 0,-3-2 0,4 0 0,3-2 0,-8 1-16,5 0 16,0 0 0,-3-1-16,1 4 0,-1-2 0,2 1 0,-3-1-64,5-1 64,1-2-80,4 2-64,-5-3 128,-5 1 0,5 1 32,-1-2 0,0 1-16,3-1 16,-3 0-48,1 2 0,-5 0-16,5 1 0,-3 1 64,-1-1 0,1-1 0,7-2-16,-5 0 16,6 0 0,-3 0 0,3 0 0,2 1 0,-2-1 0,2 0 0,-4 2 16,3-1-16,-3 1 0,2 0 16,-6 0-16,3-2 64,1 0-64,2 1 0,-2-3 16,2 0-16,0 0 0,3 2 0,-3 0 32,2 2-32,-2-1 0,-6 3 0,3 0 0,1 2 16,-3-1-16,3 0 32,-4 0-32,1-1 48,-5 0-48,4 0 0,1-2 0,3 1 0,0 0 0,2 0 0,-5 3 16,5-2-16,0 0 0,4 0 0,-4 0 0,2 0 0,-2 1-16,4-1 16,1 2-32,-3 0 16,1 0 16,-2 2-32,2 0 32,-2 0 0,-5-1 0,4 3 0,0-2 16,2 3-32,-1-2 16,-5 1 0,4 1-16,-2-2-16,6 3 16,-10 0 16,7 0-16,-1 0 16,0 0 0,-3 2 0,4 0-16,-6 0-16,-1 0 16,3 0 16,1 0 0,-3 0-16,3 0 16,-4 0 0,1 0-48,-1 4 15,-4-2 17,5 2 16,-3 1-48,7-2 48,-11 3 0,7-1 16,-1-1-16,-5 1 32,2-1-32,1 3 16,-1-2 0,1 4 33,-3-3-49,3 0 16,3 4-16,-6-1 16,5-2 0,-5 4 64,1 0-48,3 0 32,-3 2 48,3-2-32,-2 2 0,5 1 16,-1 0 16,-1-2 16,-4 2-96,3-2 112,-2 1 0,1 1-16,-1-2 16,-2 2-80,-1 0 112,3 3-96,-3 0-32,-5 0 96,6 1 16,0-1-95,-6 1 15,0 0 48,0 1 48,6-1-96,-6-1-32,0 1 16,0 1 32,0 0-96,0 1 48,0 1-32,0-2 16,0 2 64,0-1-80,0 1 16,0-2-32,-6-1 32,6 0-16,-6 0-16,0-1 0,1 0 32,-3-1-32,3 2 48,-3 0-32,2 1 0,-3 0-16,1-2 0,2 0 0,0-1 0,-5 0 0,6 3 0,-7-3 0,6 0 0,-7 0 16,6 1 0,1-1 0,-4 0 0,3 2-16,1 0 0,-6 0-16,7-1 32,-7 1 16,-1-2-32,5-1 0,-3-1 16,1 2 0,-1 0-32,3 1 0,-9-1-48,6 2 32,-3-2 32,3 0 0,-3 0-16,3-1 0,0-1 16,-1 2 0,1 1 32,-4-2-48,3-2 16,1 1 0,-1-3 0,7 1 16,-7-2 32,1-2-48,-4 0 0,5 0 32,-1-1-32,-1 0 16,4-1-16,-3 1 16,-1-3 0,1-1-16,6 0-16,-11-2-16,5-1 0,-4 0-128,7 0 96,-9 0 32,5 0-48,-8 0 0,2-1 32,3-4 48,2 0 32,1 0-16,-7 1 48,6-1-48,-2-2-16,-2-1 32,3 2-32,3-2-16,-8 0 16,6 0 0,-3-1 16,3 1 0,1-2-16,-5 0-16,4 0 16,2 0 32,-3 0 0,3 1-16,-1-1 32,1 3-32,-1-2 0,-1 1-16,2 0 16,-1-2-16,4 1 16,-3 0-16,0 2 0,-1-1 16,1 2 0,2 0-16,-3 2 16,1 0 64,-1-2-48,1 2-16,-1-2-16,1-1 16,-4 3-16,-1-2 0,3 2-64,-2-2 16,1 2 48,-3 0 0,2 1 32,3 0-16,1-1-16,-4 2 0,7-2 0,-3 2 0,-1 0 0,-3 0-48,4 2 32,-1-2 16,1 0 0,-1 0 0,1-1-16,0 3 16,-5 0 16,5-1 48,-4 1-64,1 0 32,-3 0-48,6 0 32,-8 0-16,5 0 48,3 0-32,0 0-16,-1 0 0,-5 0 0,2 0-16,-1 0 32,3 0-16,2 0 16,-1 0-16,1 0 0,-1 0 32,-1 0-16,5 0-16,-1 0 16,1 0 16,2 0-32,-5 0 0,5 0-16,-5 0 16,0 0 0,-3 0-16,3 0-16,3 0 32,-3 0 16,-1 0-16,1 0 16,-1 1-32,1-1 16,-4 0 0,5 0 0,-1 0 0,3 0 0,2 0 16,1 0 0,-1 0 0,-5 0-16,5 0-32,0 3 16,-3-3-16,-1 0 16,2 0 16,3 0 0,-1 0 16,-3 0 0,6 2-16,-2-2 0,-1 0 0,1 0 16,-1 0-16,0 2-48,0-2 32,-7 0 0,7 2-48,-1 0 64,1 0-16,0-2 0,1 0 16,-1 0-16,0 0 0,0 0 32,1 0-16,-1 0 0,0 0-32,1 0 32,-3 1-64,0-1 48,3 1 16,-1-1 0,2 2 16,2-2-16,-2 0 32,-1 0-48,3 0 16,-4 0-32,0 2-32,0 0-64,1-2 112,-1 2-16,0-2 0,1 0 32,5 0 32,-6 0-32,-2 0-16,6 0 16,-3 0 0,-1 0 32,0 0-16,0 0-16,1 0 0,-1 0 0,1 0-16,-1 0-16,0 0 32,6 0 48,-6 0-48,6 0 0,-5-2 48,5 2-48,-6 0 0,6 0 0,0 0 16,0 0 0,-6 0-16,6 0 16,0-2-16,0 2 0,-8-2-16,8 2-48,-1 0 32,-3 0 16,2 0-128,-2 0-32,2 0-64,2 0 48,-4-2-737,4 2-832,0-2-1456,0 2-1249</inkml:trace>
   <inkml:trace contextRef="#ctx0" brushRef="#br0" timeOffset="4704.5884">5180 644 4082,'0'0'2241,"0"0"-2129,0 0 1265,0 0 415,0 0-351,0 0-352,0 0-545,-2 2-144,2-2 272,0 0 145,-3 0 63,1 0-192,2 0-335,0 0-177,-6 0-16,6 0 240,0 0-272,-6 0 80,6 0-112,-6 0-96,6 0 0,-5 0-32,-1 0 32,-1 2 0,5 2-16,-2 0 16,2 1-16,-2 1-16,4 0 32,-2 0 64,2 0 32,0-1 32,0-2-48,0 0-80,2 0-48,4-2 48,7-1 32,-7 0-32,-1 0-176,1 0 176,0 0 112,0-1-112,-1-5-416,1 0 416,0 0 0,-4 0 0,-2-2-160,4 1 112,-4-1-128,0 0 0,0 2 128,0 2-160,0 0-561,0 4 769,-6 0 80,0 0 288,0 0-304,1 0-31,-1 6 143,6-2-16,-6 0-112,0 0 64,6 3-48,0-2 16,0 0-80,0 0 16,0-2-16,0 1 0,0-2-96,0 0-368,0-2-513,0 0-608,0 0-656,6 0-7619</inkml:trace>
-  <inkml:trace contextRef="#ctx0" brushRef="#br0" timeOffset="1284.6436">5203 218 6899,'0'0'2017,"0"0"-1505,0 0 1297,0 0-688,0 0-449,0 0-304,0-2-48,0 2 0,0 0 17,0 6 143,-6 3 128,-1 0-176,1 3-80,-3 2 17,7 1-33,-10 3 0,6 0-80,1 3-64,-1-1 48,6 0-128,-7 0 16,5-2 48,2-1-96,0-3 0,0-1-15,0-3-49,0-2 48,0-1-64,2-4-64,5 1-33,-1-4-31,5 0 96,-5 0-192,2 0 208,1-5 32,-1-4-32,1 1 16,-3-2-48,1-1 0,-2-1-240,4 0-400,-3-3 128,-1 0 175,1-2-223,-6-1-336,6 1 143,0 2 273,-6 0 368,0 3-240,0 1 288,0 2 112,0 1 32,0 2 32,0 0 32,0 1 336,0 1-224,0-2-64,-6 4 320,6-2-288,-6 1-63,6 0-33,-6 0 16,6 2-80,0-3 16,-5 4 0,5-1-32,0-2 0,0 3-304,-6-2-305,6 2 241,0-2 0,-8 2 16,8 0 96,-1 0 224,-4 0 16,5 0-64,0 0-145,-1 0-255,-3 0 96,2 2 320,-4 4 64,1 0 64,-1 0-64,0 2 112,2 0 48,-1-1 128,3-1-144,2 2 16,0-2-112,0 0-48,-6 0-80,6 2-144,0 1 0,0 2 112,-6 0-16,6 1 96,-6 2 0,6 0 32,0-1-32,-5-2 64,5-2-32,0 1 32,0-4-32,0-2-64,0 0-1313,-6-2 65,6 2 63,-7 1-399,5 0 927,-4-1 689,2 0 32,2 1 336,2-2 417,-4 0-161,4 0-48,0-3-96,0 2-175,0-1-193,0-1-48,0 0-32,4 0 128,-2 0-128,2 0 0,2 0-369,-4 0-95,5 0 336,-1-6 48,-1 0-352,-5-1-1169,0 3-224,0 0-160</inkml:trace>
+  <inkml:trace contextRef="#ctx0" brushRef="#br0" timeOffset="1284.6435">5203 218 6899,'0'0'2017,"0"0"-1505,0 0 1297,0 0-688,0 0-449,0 0-304,0-2-48,0 2 0,0 0 17,0 6 143,-6 3 128,-1 0-176,1 3-80,-3 2 17,7 1-33,-10 3 0,6 0-80,1 3-64,-1-1 48,6 0-128,-7 0 16,5-2 48,2-1-96,0-3 0,0-1-15,0-3-49,0-2 48,0-1-64,2-4-64,5 1-33,-1-4-31,5 0 96,-5 0-192,2 0 208,1-5 32,-1-4-32,1 1 16,-3-2-48,1-1 0,-2-1-240,4 0-400,-3-3 128,-1 0 175,1-2-223,-6-1-336,6 1 143,0 2 273,-6 0 368,0 3-240,0 1 288,0 2 112,0 1 32,0 2 32,0 0 32,0 1 336,0 1-224,0-2-64,-6 4 320,6-2-288,-6 1-63,6 0-33,-6 0 16,6 2-80,0-3 16,-5 4 0,5-1-32,0-2 0,0 3-304,-6-2-305,6 2 241,0-2 0,-8 2 16,8 0 96,-1 0 224,-4 0 16,5 0-64,0 0-145,-1 0-255,-3 0 96,2 2 320,-4 4 64,1 0 64,-1 0-64,0 2 112,2 0 48,-1-1 128,3-1-144,2 2 16,0-2-112,0 0-48,-6 0-80,6 2-144,0 1 0,0 2 112,-6 0-16,6 1 96,-6 2 0,6 0 32,0-1-32,-5-2 64,5-2-32,0 1 32,0-4-32,0-2-64,0 0-1313,-6-2 65,6 2 63,-7 1-399,5 0 927,-4-1 689,2 0 32,2 1 336,2-2 417,-4 0-161,4 0-48,0-3-96,0 2-175,0-1-193,0-1-48,0 0-32,4 0 128,-2 0-128,2 0 0,2 0-369,-4 0-95,5 0 336,-1-6 48,-1 0-352,-5-1-1169,0 3-224,0 0-160</inkml:trace>
   <inkml:trace contextRef="#ctx0" brushRef="#br0" timeOffset="2348.1522">5175 339 0,'0'0'752,"0"0"193,0 0-113,0 0-352,0 0-288,0 0-79,0 0 47,15-34 16,-15 33 320,0-1-160,0-1-192,0 1-144,2 0 0,-2 0-112,4-1 48,-3-2 32,3 1-272,-4 2-32,2 0 208,-2 0 128,0 2 560,0 0 288,0 0 113,0 0-1,0 0-31,0 0-929,0 0-305,0 0 305,0 0 97,0 4-33,0 4-32,0 0 80,-2 2 576,-2 2 64,3 0-47,-3 1-113,2-1-304,2-2 48,-4 2-144,2-1-16,2-1-64,-4-2 80,4 0-144,0-4 17,-2 0-65,2 0 48,0-2-16,0 0-32,0 0 0,0 0-64,0 2 64,-3-2 0,3-1 0,0 0 0,0-1-193,-2 2 97,2-2 96,0 0-32,0 0 32,0 0-64,0 0-32,0 0-416,0 0-464,0 0 479,2-6 497,3-2 128,1-2-128,0 0-944,-1-1 336,5 0 304,-4 0 96,0-1-417,3 2-639,-9 0 383,6 4 641,-6-3 240,0 4 160,5 0-48,-5 0-112,0 1 32,0 1-32,0-1-32,0 2 32,0-2 64,0 4 272,0 0 81,0 0 367,0 0 737,0 0-785,0 0-240,0 0-176,0 0-176,0 0 33,0 0-33,0 0 176,0-2-176,0 2-144,0 0 144,0 0 112,0 0-256,0 0-96,0 0-96,0 0 192,0 4 112,-5 1 0,5 1 96,-6-1-64,6 2 96,-8 0 208,7 2-175,-5-3 31,2 2 240,2 2-144,-4-2-240,2 0 48,3 1 32,-5-1-63,6-1-81,-4 0 112,2-1-112,-2 0-16,4 0-48,-2 0-32,-1 1 16,1-1-16,2 0 0,0-3 0,0 0 32,-6 0-32,6-3-32,0 2 32,0-1-144,0-1 64,0 0 80,0 0 0,0 0 0,0 0-80,0 0 64,0 0 16,0 0-208,0 0-241,0 0 1,0-1 240,0-5-416,6-2 576,-4-1 48,3-2-256,1 1-209,-2-2-319,2 2 192,-5 0-17,3 1 81,-2 1 144,2 0-320,-2 0 576,3 0 16,0 2-481,-4 0 177,7 0 288,-8 2-496,0 0 144,0-1 480,0 3-96,0-1-305,0-2 225,0 4 176,0-1 64,0-1 320,0 1 161,6 0-353,-6-2-192,0 2 0,0-2 0,0 0 0,5 0-64,-5 0-144,0-2-401,0 2 1,0 2 64,0 0 544,0 2 96,0-3 560,0 3 17,0 0-609,0-1-64,0 0-128,6-1 128,-6 1 32,0 1 0,0-1 32,0 1 112,0 0 272,0 0 192,0 0 433,0 0-897,0 0-176,0 0-352,0 0 352,0 0 144,0 0-32,0 0 48,0 0-160,0 0 16,0 1 112,0 0-96,0 2-32,0 1-272,0 0 272,0 0 208,0 2 112,0 0-112,0-2-80,0 0-80,-6 0-48,6 2 32,0-1 176,-5 1-128,5 0 32,-6-3 16,6 2-96,-8-2-16,8 0 16,0-3-32,0 0-816,0 0-2882</inkml:trace>
   <inkml:trace contextRef="#ctx0" brushRef="#br0" timeOffset="-16971.0182">1539 1391 4930,'-4'2'1505,"4"-2"-1409,0 0 768,0 0 209,-2 0 384,2 0-145,0 0-335,0 0-209,0 0 128,0 0 1,0 0 63,0 0-143,-4 0-337,4 0-272,-2 2-32,2-2-96,-5 0 16,5 2-64,-6-2-32,6 0 112,-6 0-48,6 0-16,-5 1 16,5-1 32,-6 0-16,0 0 32,0 0-96,6 0-16,-5 0 16,-5 0-16,6 0 16,-2 0 32,5-3 176,-5 1-111,0-4-17,3 2-16,-3-2-80,4 0-16,-4 0 0,-5 0 16,5-2 48,0-1-48,0-1 0,1 2 0,-5-2 0,4 0 0,1 0 0,-1-1-32,0 1 32,1 0 16,-1 0-16,0-2-16,0 2-80,6-3 0,-5 3 64,-1-2-49,1-1 65,5 2 16,-6-1 48,0 2-32,-2-1 0,6-1 1,-1 0-17,-3 0-17,4 0 1,-2 1 16,2 1 0,-2-2 65,-1 2-17,-1 0 64,4-2 80,-9 1-64,5-1-16,0 2-48,1-2-32,-1 0-16,0 1-16,-7-3 16,5 0-16,-1 0 0,3 0 32,-2-2-16,3 3 80,-1 1-32,0 1-32,0 0 48,1 1-32,-1-1-32,0 2 80,-7-2 0,7 1-64,-5 1-16,3-2 48,-3 1-32,5 0-32,-5-1 32,-1 2 16,1 1-16,-4-1 112,5 1 48,2 2-144,-1-2 16,1 2 32,-3-2-15,5 2 31,-5-2-64,-5-1-32,5 1-16,-1 0 16,1 0 16,-6 2 80,5-2-96,1 1 48,-8 1-32,6 0-16,1 0 0,1 2-16,0-2 16,-1 3 48,-1-2-48,1 3 0,1-2-16,-1 0 0,5 1 0,-5 0-32,1 1 32,-1 2 16,-6-2-16,4 0-16,3 2-32,-7 0 0,7 0 48,0 0 64,-8-2-48,7 2 32,1 0-32,3-1 0,-3 1-16,-1 0 0,-5 0 0,4 0 0,1 0-32,1 0 16,3 0 16,-3 0 0,-1 0 0,1 0 0,5 1 0,-7 3-16,5-2-32,-1 2 32,1 2 0,2 0 0,-5-2 16,5 2-48,-5 0 32,5 1-16,1 0 16,-9 2 0,6-1 16,3 0 0,-5 2 0,3 0-48,1-2 48,0 1 0,1-1-16,-1 1 0,0 0 0,0 1 16,1 0 0,-1 2 0,-4-2 0,6 0 0,-1 3 16,-1-1-16,1-2-16,-1 2 16,4 0-16,-4 1 16,0-1 0,1 2 16,-7-2-16,6 0 0,1 0-16,-1 1 16,-1-1 0,1 2 0,-2 0 16,2-2-16,-3 2 0,1-1 16,2-1-16,-5-1-32,6 0 32,-1 2 0,0 1 0,-7 0 0,5 0 0,-2 3 0,3-2 16,1 0-32,-5-1 16,5 0-32,0 1 16,1 0 0,-1 0 0,0-1 16,0 1-16,-3 0-16,3 2 32,0 1-32,3 0 32,1 0 0,-2 1-16,2-1 0,-2 1 16,2-1-16,2 0 16,0-2-32,0 0 15,0 1 1,0-1-16,0-2 16,0 3 0,2-3 16,4 2 0,0-2 0,-3 0 0,3 0-16,0 2 0,3-1-16,3-1 48,-6 2-64,5-2 96,1-1-48,-7 1 16,7-1-16,-1-1 16,4 3-16,-3-3 0,-6 0 0,5 0-16,0 0 16,1 0 0,-1 0 0,0-1 0,5 1 16,-5-2-16,-5-2-32,5 2 16,1-2 0,1 0 0,-2 0 16,9-2 0,-9 0-16,6-1 16,-5 1-16,1-1 16,2 0 0,1 1 0,0 0 16,-4 0 16,-1 0-32,3 0 0,-3 0-16,8 1 0,-7-3-48,-1 2 48,1-2 16,-5 0-64,5-2 16,-3 2 0,3 0 32,3-2 0,-4 0 0,1 0-128,-1-2-64,-5 0 144,5 0 48,-3 0 16,3 0-48,3 0-16,-3 0 32,0 0 32,1 0-32,-4-4-16,3 0-128,1 0-80,6-2 80,-6 0 160,-1-2 32,1-1 32,1 2 16,-2-1-64,5 1-128,-1-1-32,-3-2 144,5 2-16,-6-3 16,2 1 16,-1-2-32,1-2-80,-2 2-17,1-2-31,-1 0 112,-5 3-64,2-3-64,3 2 128,-1 0 32,-3-1-48,7 3 48,-3-1 16,-5 0 0,5 3-64,-5-2 64,0 1 0,-1 3-112,1-2 112,2-1-48,-3 3 48,1 0 0,8 0 0,-9 0-32,1 0 32,0-2 0,-1 2 0,7 0 16,-7-3-16,3 1 16,1 1-32,-1 1 16,4-3 0,1 1-16,-2 0 16,-5 2 0,6 0 0,-5 2-32,3-2 16,-5 3 16,3-1 0,2 1-48,-1 0 16,-3-1 0,5 0 16,-5 1 16,5 0-64,-3 0-48,2-2 96,-3 3-256,2 0 96,-1 0-160,6 0 304,-8 1-33,5 0 17,-6-1-80,1 0 80,2 0 0,1-2 0,3 0 16,-5-1 64,7 2-32,-9-1 0,1-1 16,0 3-32,0 1 32,-1-2-16,-5 3 32,6-1-32,-6-1 0,6 2 0,-4-1 0,4-1-32,-3 1 64,3-2-32,-4 3 16,2 0 16,-3 0-64,3 0-32,-2 0 64,2 0 64,-2 0-16,6-2-16,-3 2 96,1-2-15,-6 2-113,6-2 160,0 2-160,-6 0-64,5 0 48,1 0 16,-6 0 0,0 0-32,0 0-16,0 0-241,0 0-1039,0 0-2242,0 0-7651</inkml:trace>
-  <inkml:trace contextRef="#ctx0" brushRef="#br0" timeOffset="-5293.4379">504 973 1329,'0'0'640,"0"0"-112,0 0 353,0 0-385,0 0-128,0 0-224,0 0 96,0 0 272,0 0 97,0 0-1,0 0-192,0 0-240,0 0-48,0 0-128,2 0-32,2 0-32,-2 0-208,2 0 256,1 0 32,1-4 256,0 2-240,-4 0 32,2 2 48,-3 0-16,-1 0-64,0 0 288,0 0 337,0 0-337,0 0-160,0 0 384,8 0 241,-8 2-465,0 0-144,6 0-16,0 0-16,-1 0-144,1 0 224,0 0-160,0-2-32,-1 2 80,1-2-96,-6 0 48,6 2-32,-5-2-32,3 4 0,-4-2-64,2 0-240,2 2 304,-2 0 192,4-1-192,-1-3 0,9 1-48,-9-1-48,7 0-320,-7 0 16,7 0 368,-6 0 32,-4 0 0,1 0-176,-1 0 96,-2 0-64,4 0 47,-2 0-15,2 0 112,1 0 112,1 2-112,0-1 65,3-1-33,3 0 16,-6 0 16,-1 2-64,1-2 0,0 1-64,-1-1 64,3 0 0,3 0 0,5-1-785,-1-5 753,2-2-304,-5 2-560,1-1 832,-4 3 96,-7 2-32,2 2 32,-4 0 144,0 0 208,2 0 288,-2-1-144,4 0-528,1 1 144,5-2 177,-4-1 47,5 0-272,1 1-96,1-2 0,-1 4-288,-3 0-144,-1 0-529,-5 0-1328,-3 0-1409</inkml:trace>
+  <inkml:trace contextRef="#ctx0" brushRef="#br0" timeOffset="-5293.4378">504 973 1329,'0'0'640,"0"0"-112,0 0 353,0 0-385,0 0-128,0 0-224,0 0 96,0 0 272,0 0 97,0 0-1,0 0-192,0 0-240,0 0-48,0 0-128,2 0-32,2 0-32,-2 0-208,2 0 256,1 0 32,1-4 256,0 2-240,-4 0 32,2 2 48,-3 0-16,-1 0-64,0 0 288,0 0 337,0 0-337,0 0-160,0 0 384,8 0 241,-8 2-465,0 0-144,6 0-16,0 0-16,-1 0-144,1 0 224,0 0-160,0-2-32,-1 2 80,1-2-96,-6 0 48,6 2-32,-5-2-32,3 4 0,-4-2-64,2 0-240,2 2 304,-2 0 192,4-1-192,-1-3 0,9 1-48,-9-1-48,7 0-320,-7 0 16,7 0 368,-6 0 32,-4 0 0,1 0-176,-1 0 96,-2 0-64,4 0 47,-2 0-15,2 0 112,1 0 112,1 2-112,0-1 65,3-1-33,3 0 16,-6 0 16,-1 2-64,1-2 0,0 1-64,-1-1 64,3 0 0,3 0 0,5-1-785,-1-5 753,2-2-304,-5 2-560,1-1 832,-4 3 96,-7 2-32,2 2 32,-4 0 144,0 0 208,2 0 288,-2-1-144,4 0-528,1 1 144,5-2 177,-4-1 47,5 0-272,1 1-96,1-2 0,-1 4-288,-3 0-144,-1 0-529,-5 0-1328,-3 0-1409</inkml:trace>
   <inkml:trace contextRef="#ctx0" brushRef="#br0" timeOffset="-4199.8418">493 1178 10757,'0'0'0,"0"0"-368,0 0 368,0 0 960,55-34-624,-38 21 193,1 1-529,-7 4 80,-9 6-112,2 2 32,-4 0-465,0 0 449,0 4 16,1 2 929,-1 4-241,4-2-256,-2 0-384,4-2 0,-3-1-48,5-1-16,6-4-512,-3 0-112,6 0-433,-5-7-287,1-1 687,2 2 465,-7 4-112,-1 2 272,-7 0-480,6 0 192,-6 0 336,0 6 768,6-2-128,-6 0-367,0 1-161,6-3-112,-1-2 0,7 0-64,-5 0 48,10-5-289,8-4 257,-2-2-1953,-4 3 465,-4 4-497,-7 2 1649,-4 2-113,-4 0 497,0 0 305,0 6 2480,0-2-800,0 0-433,0-1-559,2-1-849,11-2-48,-7 0 32,5 0 0,6 0-112,-9 0-16,4 0-256,-12 0-2049,0 0-2433</inkml:trace>
   <inkml:trace contextRef="#ctx0" brushRef="#br1" timeOffset="-315140.3601">1700 1081 2369,'0'0'2257,"0"0"-1184,0 0 511,0 0 337,0 0-192,0 0-560,0 0-241,2-6-48,-2 6-175,0 0 127,0 0-160,0 0-239,0 0-193,0 0 64,0 0-64,0 0-208,0 0 32,0 0-32,0 0 32,0 0 16,0 0-16,0 0-64,0 0 0,0 0-16,0 0-16,0 0-160,0 0 0,0 4 192,0 3 176,0 1-48,-2 1-16,-4-2-48,6 2-48,0 1 0,-2 1 32,-3 0-32,5 1-16,-2-1 64,2-1-32,0-2-16,0 2 0,0 2 32,0-1-48,-5 3 48,5-3 0,0 2-48,0-1 0,0-1 0,0 2 0,0-1 32,0-2 0,0 4-32,0-3 0,0 2-16,-2-2 16,2 1 16,-4 1 64,1 2-32,-2 0-32,3-2 64,2 2-80,0-1 0,-7 1 112,7 0-48,-8-1 1,8 2-49,-7-3 112,7-1-128,0 3 0,-7-2 16,7 1-16,0-3 16,0 2-16,0-1 0,0-1 32,-7 0-32,7 0 32,0-1 0,0 0-32,0-1 0,0 0 0,0 3-16,0-1 16,-7 1-16,7-4-16,0 5 32,0-3 48,0 2-48,0-1 0,-7-2-16,7 1 16,0 1 16,0-1 16,0 0 0,0-2-32,0 2 16,0 1-16,0-1-16,0 2 16,0-2 0,0 3 0,0-1 16,0-1 0,0 1-16,0-1 32,0-2-32,0 5-48,0-4 0,0 1 48,0 0 32,0 0-16,0-1-16,0 2 16,0-4-16,0 4-16,0-1-32,0 2 48,0 1 0,0-1 48,0 0-48,0 0-16,0 1 16,0-3 0,0 4 0,0-2 16,0 2-32,0-2-112,0-3 128,0 3 0,0-1 0,0 1 16,0 0-16,0 1-48,0-1-16,0 0 48,0 0 16,0-1 0,0 1-48,0 0 16,0 2 32,0 1 16,0 2-16,0-1 0,-8-2 0,8 1 0,0-1-16,0 0 16,0-2 32,0 1-32,0-1-16,0 0 0,0 3-65,0-4 81,0 3 33,0-1-33,0-3 0,0 3-17,0-2 1,0 4 16,0-3-16,0-2-16,0 0 32,0-1 0,0 2 0,0-3 0,0 1 48,0 0-48,0-1 0,0 0 0,0 0-96,0-1 96,0 3 48,0-1-48,0 2 0,0 1-32,0-1 96,0 1-128,0-3 64,0 1 0,0-1 16,0-3-16,0 1 0,0 0 64,0-2-48,0 3-16,0-2 0,0 1-64,8-1 48,-8 1-80,0 3 48,0-1 48,0-1 80,0 2-80,0-2 48,0-1-48,0 0 0,0 2 16,7-2-16,-7 1 0,0-1-32,0 1 32,0 0 32,0-3-32,7 3-32,-7-3 32,0 2-80,0-1 80,0 0 0,0-1 0,0-1 16,0 2-16,7-2 32,-7 3-32,0 0 0,0-1 0,0 1 0,0-1 0,0 1 0,0-3 0,0 1-16,0-4-144,0 3 160,0-5-160,0 1-32,0-1-464,7 0-1057,-7-2-1696,0-5-1586</inkml:trace>
-  <inkml:trace contextRef="#ctx0" brushRef="#br1" timeOffset="-312514.1409">1754 1073 3169,'0'0'2065,"0"0"-1392,0 0 1184,0 0 304,0 0-145,0 0-559,0 0-160,0 0-113,0 0-399,0 0-209,0 0-96,0 0-128,0 0-32,0 0-111,0 0-97,0 0-64,0 0-48,0 0-112,0 0-1,0 0-127,0 0 16,0 0 208,15 0 16,-8 0-16,7 0 16,0 0 48,-2 0 80,2 0-64,1 0-48,-1 0 16,0 0-32,1 0 48,-1 0-32,5 0-16,-5 0 48,0 0-48,1 0 0,-1 0 32,3 0-16,-3 0 16,3 0-32,-3 0-48,0 0 48,1 0 48,-1 0-16,-7 0 49,2 0-1,-1 0-64,3 0-16,-3-1 0,3 1 48,-3 0-32,-1 0 16,7 0 0,0 0 16,-4 0 16,4-1-32,5-2-16,8 2 16,-6-3 0,1 1 16,-6 3 0,-2 0-32,1-2-16,1 2 16,-8 0-16,-1 0-16,0 0 16,-7 0 16,14 0 32,-7 0-48,7 0-16,3 0 16,7 0 48,-3-1-16,1 0-32,-5-2-16,2 3 16,-5 0 32,5-1-32,-5 1-16,-7 0 16,1 0 0,6 0 16,-7 0-16,7 0 80,0 0-80,3 0-16,7 0 16,-10 0 0,0 0 16,1 0-16,-6 0 0,3 0-16,-5 0 32,1 0-16,3 0 0,-4 0 16,1 0-16,7 0 16,-8 0-16,0 0 0,3 0 16,2 0-16,2 0 0,-5 0-32,8 0 32,-2 0 0,-8 0 0,0 0 0,0 0 16,0 0-16,0 1 0,1-1 0,-1 0 32,-1 0-32,4 0 0,2 2-16,0-2 16,2 0 0,0 0-16,1 0 16,-1 0-16,-7 0 32,3 0-16,-3 0 16,0 0-16,0 0 0,1 0 0,1 0 0,-2 0 0,0 0 0,0 0 0,0 0 0,8 0-16,-8 0 0,0 0-16,2 0 32,-1 0 0,-1 0 0,0 0-32,-7 0-16,5 0-64,-5 0 16,0 0 80,0 0 16,0 0 32,0 0 16,0 0-32,0 0-16,0 0 16,0 0-16,0 0 0,0 0-16,0 0-16,0 0-64,0 0 16,0 0 0,0 0-112,0 0 192,0 0-80,0 0-65,0 0 97,0 0 0,0 0-32,0 0-32,0 1 112,0 3 48,0 2 0,0 0 48,0 1 32,0-1-79,0 2 15,0 0-64,0-1 48,0 1-32,0 2 0,0-2 0,0 2 64,0 0-80,0-1 0,0 0 64,0 1-64,0 0 32,0-2-32,0 1 0,0-1-32,0 0 16,0 3 16,0-2 0,0 1 0,0 1 0,0-1 16,0 0 16,0 1 80,0-2-16,0 2-48,0-2-32,0 1-16,0-2 0,0 3 16,0-1 48,0-1-64,0 1 48,0 1-48,0 0 0,0 0-64,0 1 16,0-1 32,0 0 0,0 1 32,0-2 16,-5 1 0,5-1 32,0 2-64,-2-1 64,2 0-32,0-2-16,0 4 0,0 0-16,-5-1 0,5 3 0,0-2 0,0 2 16,0-3-16,0 1 32,-2-1-32,2-2 0,-5 2 0,5 1 48,0 0-48,0 0 0,0 0 0,0-3 32,0 1 0,0-3-16,0 1-16,0 1 32,0 0-32,0 0 16,0 2-16,0-1 0,0 1-16,0-1 16,0 4 0,0-2 0,0-1 0,0-1 0,0-1 0,5 0 16,-5-1-16,2 0 16,-2-2-16,5 1 0,-5 3 16,0-2-32,2 1-16,-2 2 32,0-1 16,5 1 0,-5 1 0,2 1-32,-2-2 16,0 3 0,0-2 32,0 2-16,10 0-32,-10 1 16,0-1 0,0 0 48,0 2-48,7-1 32,-7-4-16,0 4 16,0-1-32,0 1 0,0 0 0,0 1-16,0-2 32,0 0-32,0 2 32,0-1 0,0-4-16,0 4 0,0-1-16,0 0 16,0 0 16,0 0 0,0 1 16,0-4-32,0 4-16,0-2 0,0 0 0,0 1 0,0 0 16,0 0 32,0 3-16,0-2 0,0 0-16,0 1 0,0-3 0,0 2 0,0-1 32,0-1-48,0-1 16,0 0 0,0-1 16,0 0 0,0-2-16,0 2 0,0-2 0,0 0 0,0 1 48,0-1-48,0 0 0,0 3-64,0-1 64,-7 1 0,7-1 48,0 1-48,0-3 16,-10 1-16,10-1 16,0 3-16,0-3 0,0-1-16,0 1 32,0-3-16,0-1 0,0-1 0,0 1 0,0 1 0,0 1 0,0-1 0,0 0 16,0-1 0,0 2 0,0 0 0,0 0-16,0 1 0,0 1 0,0-2 0,0 0-32,0-1 32,0 1 0,0-1 16,0 1-64,0 0 96,0 1-48,0 0 0,0-2-16,0 0 16,0 0 0,0-1 0,0-3 0,0 3 0,0-3 0,-2 3 32,2 1-32,0-1 0,0 1 16,0-2-16,0-2 0,0 1-32,-5-1 32,5 0 16,0-1-16,0-1 0,0 1 16,0-2 0,0 3-32,0-1 0,0 0 16,0-1-16,0 1 0,0 2 16,-2 0 0,2 0-48,0-1 32,0 0-64,0 0-48,0-1-112,0 1 0,0-1-112,0 1 48,-5 1-33,5-1-111,0-1-416,0-2-321,0 0-624,0 0-2913</inkml:trace>
+  <inkml:trace contextRef="#ctx0" brushRef="#br1" timeOffset="-312514.1408">1754 1073 3169,'0'0'2065,"0"0"-1392,0 0 1184,0 0 304,0 0-145,0 0-559,0 0-160,0 0-113,0 0-399,0 0-209,0 0-96,0 0-128,0 0-32,0 0-111,0 0-97,0 0-64,0 0-48,0 0-112,0 0-1,0 0-127,0 0 16,0 0 208,15 0 16,-8 0-16,7 0 16,0 0 48,-2 0 80,2 0-64,1 0-48,-1 0 16,0 0-32,1 0 48,-1 0-32,5 0-16,-5 0 48,0 0-48,1 0 0,-1 0 32,3 0-16,-3 0 16,3 0-32,-3 0-48,0 0 48,1 0 48,-1 0-16,-7 0 49,2 0-1,-1 0-64,3 0-16,-3-1 0,3 1 48,-3 0-32,-1 0 16,7 0 0,0 0 16,-4 0 16,4-1-32,5-2-16,8 2 16,-6-3 0,1 1 16,-6 3 0,-2 0-32,1-2-16,1 2 16,-8 0-16,-1 0-16,0 0 16,-7 0 16,14 0 32,-7 0-48,7 0-16,3 0 16,7 0 48,-3-1-16,1 0-32,-5-2-16,2 3 16,-5 0 32,5-1-32,-5 1-16,-7 0 16,1 0 0,6 0 16,-7 0-16,7 0 80,0 0-80,3 0-16,7 0 16,-10 0 0,0 0 16,1 0-16,-6 0 0,3 0-16,-5 0 32,1 0-16,3 0 0,-4 0 16,1 0-16,7 0 16,-8 0-16,0 0 0,3 0 16,2 0-16,2 0 0,-5 0-32,8 0 32,-2 0 0,-8 0 0,0 0 0,0 0 16,0 0-16,0 1 0,1-1 0,-1 0 32,-1 0-32,4 0 0,2 2-16,0-2 16,2 0 0,0 0-16,1 0 16,-1 0-16,-7 0 32,3 0-16,-3 0 16,0 0-16,0 0 0,1 0 0,1 0 0,-2 0 0,0 0 0,0 0 0,0 0 0,8 0-16,-8 0 0,0 0-16,2 0 32,-1 0 0,-1 0 0,0 0-32,-7 0-16,5 0-64,-5 0 16,0 0 80,0 0 16,0 0 32,0 0 16,0 0-32,0 0-16,0 0 16,0 0-16,0 0 0,0 0-16,0 0-16,0 0-64,0 0 16,0 0 0,0 0-112,0 0 192,0 0-80,0 0-65,0 0 97,0 0 0,0 0-32,0 0-32,0 1 112,0 3 48,0 2 0,0 0 48,0 1 32,0-1-79,0 2 15,0 0-64,0-1 48,0 1-32,0 2 0,0-2 0,0 2 64,0 0-80,0-1 0,0 0 64,0 1-64,0 0 32,0-2-32,0 1 0,0-1-32,0 0 16,0 3 16,0-2 0,0 1 0,0 1 0,0-1 16,0 0 16,0 1 80,0-2-16,0 2-48,0-2-32,0 1-16,0-2 0,0 3 16,0-1 48,0-1-64,0 1 48,0 1-48,0 0 0,0 0-64,0 1 16,0-1 32,0 0 0,0 1 32,0-2 16,-5 1 0,5-1 32,0 2-64,-2-1 64,2 0-32,0-2-16,0 4 0,0 0-16,-5-1 0,5 3 0,0-2 0,0 2 16,0-3-16,0 1 32,-2-1-32,2-2 0,-5 2 0,5 1 48,0 0-48,0 0 0,0 0 0,0-3 32,0 1 0,0-3-16,0 1-16,0 1 32,0 0-32,0 0 16,0 2-16,0-1 0,0 1-16,0-1 16,0 4 0,0-2 0,0-1 0,0-1 0,0-1 0,5 0 16,-5-1-16,2 0 16,-2-2-16,5 1 0,-5 3 16,0-2-32,2 1-16,-2 2 32,0-1 16,5 1 0,-5 1 0,2 1-32,-2-2 16,0 3 0,0-2 32,0 2-16,10 0-32,-10 1 16,0-1 0,0 0 48,0 2-48,7-1 32,-7-4-16,0 4 16,0-1-32,0 1 0,0 0 0,0 1-16,0-2 32,0 0-32,0 2 32,0-1 0,0-4-16,0 4 0,0-1-16,0 0 16,0 0 16,0 0 0,0 1 16,0-4-32,0 4-16,0-2 0,0 0 0,0 1 0,0 0 16,0 0 32,0 3-16,0-2 0,0 0-16,0 1 0,0-3 0,0 2 0,0-1 32,0-1-48,0-1 16,0 0 0,0-1 16,0 0 0,0-2-16,0 2 0,0-2 0,0 0 0,0 1 48,0-1-48,0 0 0,0 3-64,0-1 64,-7 1 0,7-1 48,0 1-48,0-3 16,-10 1-16,10-1 16,0 3-16,0-3 0,0-1-16,0 1 32,0-3-16,0-1 0,0-1 0,0 1 0,0 1 0,0 1 0,0-1 0,0 0 16,0-1 0,0 2 0,0 0 0,0 0-16,0 1 0,0 1 0,0-2 0,0 0-32,0-1 32,0 1 0,0-1 16,0 1-64,0 0 96,0 1-48,0 0 0,0-2-16,0 0 16,0 0 0,0-1 0,0-3 0,0 3 0,0-3 0,-2 3 32,2 1-32,0-1 0,0 1 16,0-2-16,0-2 0,0 1-32,-5-1 32,5 0 16,0-1-16,0-1 0,0 1 16,0-2 0,0 3-32,0-1 0,0 0 16,0-1-16,0 1 0,0 2 16,-2 0 0,2 0-48,0-1 32,0 0-64,0 0-48,0-1-112,0 1 0,0-1-112,0 1 48,-5 1-33,5-1-111,0-1-416,0-2-321,0 0-624,0 0-2913</inkml:trace>
   <inkml:trace contextRef="#ctx0" brushRef="#br1" timeOffset="-308517.4398">1692 3248 2929,'0'0'1457,"0"0"-513,0 0 529,0 0-753,0 0 433,0 0 336,0 0-273,0 0-624,0 0-303,0 0-33,0 0 48,0 0-128,0 0-176,0-1-48,0 1-80,-5 0 96,5 0 32,-2 0 0,-3 0 0,5 0-32,-2 0 32,2 0 192,0 0 0,-4 0 16,4-1-48,0 1 80,0-1 192,0 1 177,0 0-209,0 0-272,0 0 0,0 0-32,0-2-96,0 2-128,0 0-64,0 0-128,0 0 32,0 0 272,6 0 16,1 0 0,0 0 48,10 0 80,-9 0 16,6 0-32,-7 0-112,7 0 48,1 0 368,-6 2-176,5-2 144,-2 0-320,0 0-64,2 1 0,-7-1 0,8 1 160,-1 0-111,-4-1 127,4 0-176,0 0 0,3 0 96,-3 0 32,0 0-48,-6 0 48,6 0-64,-7 0 16,2 0 16,6 0 32,-3 0 64,7 0-96,-5 0-64,-7 0 64,8 0 0,-8 0-96,2 0 32,3 0 32,-2 0-64,1 0 32,-1 0 0,7 0 64,-3 0-80,0 0 32,1 0 48,-6 0-80,3 0-16,2 0 0,-4 0 0,7 0 0,4 0 0,-7 0 96,3 0 16,2 0-96,7 0 17,-11 0-1,-1 0-16,0 0-16,0 2 0,-7 1-177,3 0 145,2-1 32,7 1 64,-12 0 0,7-1-31,8 1-33,-8-2 80,8 0 32,4-1-80,-5 2 0,1 1-32,-6-2 128,4 1-112,-4 0-16,1 0 80,-3-1-16,0-1-64,0 2 64,-4-2-32,2 0 112,-2 3-48,1-3 16,-1 2-32,6-1-48,-8 1-32,-1 0 16,1-1-32,-1 1 32,7-2-32,-6 0 64,6 0-48,0 0 48,5 0 16,-4 0-32,-8 0-32,0 0-16,0 0 0,0 0 0,0 3 16,-7-3 0,8 0 32,-1 0 0,2 0-16,3 0 96,7 0-96,-5 0 96,0 0-96,-6 0 0,6 0-16,-7 0-16,-4 0 16,4 0 16,-3 0-16,4 0 48,-1 0-48,-5 0 0,5 0 0,-2 0 0,7 0 0,-5 0 48,0-3-32,0 3-16,0 0 0,1-3 32,-1 1-48,0 0 16,-5 2 0,5-1 0,0-1 0,1 2 0,-1-3 16,-2 1 16,-5 2-48,2 0 32,-2 0 0,0 0 80,0 0-96,0 0-304,0 0-32,0 0-544,0 0-1393,0 0-2674</inkml:trace>
   <inkml:trace contextRef="#ctx0" brushRef="#br1" timeOffset="-301244.7826">2111 2838 16247,'0'0'0,"0"0"-1728,0 0 1424,0 0 304,0 0 752,101 9-112,-49-21 145,-7-2-737,0 3 656,-9 3-320,-15 5-304,1 1-80,-3 2 0,-12 0-16,7 0-112,-7 0 208,8 0-80,-1 0 0,-4 0-240,11 0-336,3 0-593,-17 0-1760,0 0-2530</inkml:trace>
   <inkml:trace contextRef="#ctx0" brushRef="#br1" timeOffset="-303306.8375">2033 1433 8020,'0'0'32,"0"0"1056,66-24 673,-37 17-977,2 0-111,-2 2-369,-5 3-288,-3 2 16,3 0-64,-3 0 64,-6 0-32,-6 0 0,3 0 48,-5 0 16,2 2-16,8 1-48,-10-1-48,1 4-112,6-1 160,-7-1 96,7 1 0,0-2 112,3 0 112,14-1-272,-2 0 144,-5-1-144,4-1 0,3 0 0,5 0-48,-13 0-288,4-6 80,-8 1 416,-5 3-176,-7 2 16,0 0-48,0 0-336,0 0 336,3 0 0,9-1-400,-16-1-1345,4 1-1745</inkml:trace>
@@ -423,7 +423,7 @@
           <a:p>
             <a:fld id="{311397B5-8C69-41E8-80AB-B2B64B3912C3}" type="datetimeFigureOut">
               <a:rPr lang="de-DE" smtClean="0"/>
-              <a:t>19.03.2018</a:t>
+              <a:t>27.03.2018</a:t>
             </a:fld>
             <a:endParaRPr lang="de-DE"/>
           </a:p>
@@ -593,7 +593,7 @@
           <a:p>
             <a:fld id="{311397B5-8C69-41E8-80AB-B2B64B3912C3}" type="datetimeFigureOut">
               <a:rPr lang="de-DE" smtClean="0"/>
-              <a:t>19.03.2018</a:t>
+              <a:t>27.03.2018</a:t>
             </a:fld>
             <a:endParaRPr lang="de-DE"/>
           </a:p>
@@ -773,7 +773,7 @@
           <a:p>
             <a:fld id="{311397B5-8C69-41E8-80AB-B2B64B3912C3}" type="datetimeFigureOut">
               <a:rPr lang="de-DE" smtClean="0"/>
-              <a:t>19.03.2018</a:t>
+              <a:t>27.03.2018</a:t>
             </a:fld>
             <a:endParaRPr lang="de-DE"/>
           </a:p>
@@ -943,7 +943,7 @@
           <a:p>
             <a:fld id="{311397B5-8C69-41E8-80AB-B2B64B3912C3}" type="datetimeFigureOut">
               <a:rPr lang="de-DE" smtClean="0"/>
-              <a:t>19.03.2018</a:t>
+              <a:t>27.03.2018</a:t>
             </a:fld>
             <a:endParaRPr lang="de-DE"/>
           </a:p>
@@ -1189,7 +1189,7 @@
           <a:p>
             <a:fld id="{311397B5-8C69-41E8-80AB-B2B64B3912C3}" type="datetimeFigureOut">
               <a:rPr lang="de-DE" smtClean="0"/>
-              <a:t>19.03.2018</a:t>
+              <a:t>27.03.2018</a:t>
             </a:fld>
             <a:endParaRPr lang="de-DE"/>
           </a:p>
@@ -1421,7 +1421,7 @@
           <a:p>
             <a:fld id="{311397B5-8C69-41E8-80AB-B2B64B3912C3}" type="datetimeFigureOut">
               <a:rPr lang="de-DE" smtClean="0"/>
-              <a:t>19.03.2018</a:t>
+              <a:t>27.03.2018</a:t>
             </a:fld>
             <a:endParaRPr lang="de-DE"/>
           </a:p>
@@ -1788,7 +1788,7 @@
           <a:p>
             <a:fld id="{311397B5-8C69-41E8-80AB-B2B64B3912C3}" type="datetimeFigureOut">
               <a:rPr lang="de-DE" smtClean="0"/>
-              <a:t>19.03.2018</a:t>
+              <a:t>27.03.2018</a:t>
             </a:fld>
             <a:endParaRPr lang="de-DE"/>
           </a:p>
@@ -1906,7 +1906,7 @@
           <a:p>
             <a:fld id="{311397B5-8C69-41E8-80AB-B2B64B3912C3}" type="datetimeFigureOut">
               <a:rPr lang="de-DE" smtClean="0"/>
-              <a:t>19.03.2018</a:t>
+              <a:t>27.03.2018</a:t>
             </a:fld>
             <a:endParaRPr lang="de-DE"/>
           </a:p>
@@ -2001,7 +2001,7 @@
           <a:p>
             <a:fld id="{311397B5-8C69-41E8-80AB-B2B64B3912C3}" type="datetimeFigureOut">
               <a:rPr lang="de-DE" smtClean="0"/>
-              <a:t>19.03.2018</a:t>
+              <a:t>27.03.2018</a:t>
             </a:fld>
             <a:endParaRPr lang="de-DE"/>
           </a:p>
@@ -2278,7 +2278,7 @@
           <a:p>
             <a:fld id="{311397B5-8C69-41E8-80AB-B2B64B3912C3}" type="datetimeFigureOut">
               <a:rPr lang="de-DE" smtClean="0"/>
-              <a:t>19.03.2018</a:t>
+              <a:t>27.03.2018</a:t>
             </a:fld>
             <a:endParaRPr lang="de-DE"/>
           </a:p>
@@ -2531,7 +2531,7 @@
           <a:p>
             <a:fld id="{311397B5-8C69-41E8-80AB-B2B64B3912C3}" type="datetimeFigureOut">
               <a:rPr lang="de-DE" smtClean="0"/>
-              <a:t>19.03.2018</a:t>
+              <a:t>27.03.2018</a:t>
             </a:fld>
             <a:endParaRPr lang="de-DE"/>
           </a:p>
@@ -2744,7 +2744,7 @@
           <a:p>
             <a:fld id="{311397B5-8C69-41E8-80AB-B2B64B3912C3}" type="datetimeFigureOut">
               <a:rPr lang="de-DE" smtClean="0"/>
-              <a:t>19.03.2018</a:t>
+              <a:t>27.03.2018</a:t>
             </a:fld>
             <a:endParaRPr lang="de-DE"/>
           </a:p>
@@ -4166,7 +4166,7 @@
       </p:pic>
       <p:pic>
         <p:nvPicPr>
-          <p:cNvPr id="8" name="Grafik 7"/>
+          <p:cNvPr id="2" name="Grafik 1"/>
           <p:cNvPicPr>
             <a:picLocks noChangeAspect="1"/>
           </p:cNvPicPr>
@@ -4180,8 +4180,8 @@
         </p:blipFill>
         <p:spPr>
           <a:xfrm>
-            <a:off x="551214" y="3633503"/>
-            <a:ext cx="11178682" cy="3002428"/>
+            <a:off x="551214" y="3722223"/>
+            <a:ext cx="11178590" cy="2705489"/>
           </a:xfrm>
           <a:prstGeom prst="rect">
             <a:avLst/>
@@ -7276,7 +7276,7 @@
       </p:grpSpPr>
       <p:pic>
         <p:nvPicPr>
-          <p:cNvPr id="4" name="Grafik 3"/>
+          <p:cNvPr id="3" name="Grafik 2"/>
           <p:cNvPicPr>
             <a:picLocks noChangeAspect="1"/>
           </p:cNvPicPr>
@@ -7290,8 +7290,8 @@
         </p:blipFill>
         <p:spPr>
           <a:xfrm>
-            <a:off x="314556" y="1565954"/>
-            <a:ext cx="11778827" cy="1934891"/>
+            <a:off x="314556" y="1346464"/>
+            <a:ext cx="11838938" cy="1797330"/>
           </a:xfrm>
           <a:prstGeom prst="rect">
             <a:avLst/>
@@ -7400,7 +7400,7 @@
       </p:sp>
       <p:pic>
         <p:nvPicPr>
-          <p:cNvPr id="4" name="Grafik 3"/>
+          <p:cNvPr id="5" name="Grafik 4"/>
           <p:cNvPicPr>
             <a:picLocks noChangeAspect="1"/>
           </p:cNvPicPr>
@@ -7414,8 +7414,8 @@
         </p:blipFill>
         <p:spPr>
           <a:xfrm>
-            <a:off x="314556" y="1565954"/>
-            <a:ext cx="11778827" cy="1934891"/>
+            <a:off x="314556" y="4352452"/>
+            <a:ext cx="11778827" cy="1342952"/>
           </a:xfrm>
           <a:prstGeom prst="rect">
             <a:avLst/>
@@ -7424,7 +7424,7 @@
       </p:pic>
       <p:pic>
         <p:nvPicPr>
-          <p:cNvPr id="5" name="Grafik 4"/>
+          <p:cNvPr id="2" name="Grafik 1"/>
           <p:cNvPicPr>
             <a:picLocks noChangeAspect="1"/>
           </p:cNvPicPr>
@@ -7438,8 +7438,8 @@
         </p:blipFill>
         <p:spPr>
           <a:xfrm>
-            <a:off x="314556" y="4352452"/>
-            <a:ext cx="11778827" cy="1342952"/>
+            <a:off x="314556" y="1346464"/>
+            <a:ext cx="11838938" cy="1797330"/>
           </a:xfrm>
           <a:prstGeom prst="rect">
             <a:avLst/>

</xml_diff>

<commit_message>
Remove unnecessary slides in Refactoring
</commit_message>
<xml_diff>
--- a/06_refactoring/refactoring_slides.pptx
+++ b/06_refactoring/refactoring_slides.pptx
@@ -44,12 +44,8 @@
     <p:sldId id="314" r:id="rId38"/>
     <p:sldId id="320" r:id="rId39"/>
     <p:sldId id="321" r:id="rId40"/>
-    <p:sldId id="315" r:id="rId41"/>
-    <p:sldId id="316" r:id="rId42"/>
-    <p:sldId id="317" r:id="rId43"/>
-    <p:sldId id="318" r:id="rId44"/>
-    <p:sldId id="275" r:id="rId45"/>
-    <p:sldId id="262" r:id="rId46"/>
+    <p:sldId id="275" r:id="rId41"/>
+    <p:sldId id="262" r:id="rId42"/>
   </p:sldIdLst>
   <p:sldSz cx="12192000" cy="6858000"/>
   <p:notesSz cx="6858000" cy="9144000"/>
@@ -233,7 +229,7 @@
   <inkml:trace contextRef="#ctx0" brushRef="#br0" timeOffset="-5735.8791">3517 2123 11877,'0'0'2498,"0"0"-2322,0 0 368,0 0-240,0 0 464,0 0 225,0 0-305,22 31-64,-15-22 1,0 3-129,5-1-80,-12 4-96,14 0-48,-7 3-31,1-2-145,-1 0-32,0 0 16,0-1-48,0 1-16,0 1 16,-5-4-16,6 0-16,-4 0 16,-1-3 0,1-3-32,-4 0-128,3-2-289,-3-1-255,5-2-480,-5 1-817,0-3-1041,0 0-4769</inkml:trace>
   <inkml:trace contextRef="#ctx0" brushRef="#br0" timeOffset="-4432.6546">3524 2069 9989,'0'0'3473,"0"0"-3393,0 0 721,0 0-225,0 0 688,0 0 17,41 20-545,-34-15-159,7 1-177,-6-1-224,6-1-16,0-1-80,-5 1-64,3 0 64,3-2-80,4 0-496,-12-2-1041,0 0-1937,-7 0-6386</inkml:trace>
   <inkml:trace contextRef="#ctx0" brushRef="#br0" timeOffset="-1957.7772">3217 3009 4178,'0'0'2801,"0"0"-2641,0 0-16,0 0 721,0 0 335,0 0-671,0 0-209,7 19-48,-5-15 224,4-1 128,-4 1 49,-2 0-17,9-1-192,-9-1-256,0 3-208,0-2 0,0-1 48,0 1 304,0 0 305,0 1-273,-11-3-384,3-1-256,1 0-272,0 0-289,2-5-1024,3-3 977,2-2 208,0-1 544,0 2 224,0 1-48,2 2 144,3 4 64,-2 2-16,-3 0-256,0 0-336,0 0 16,0 0 320,0 0 32,0 0-32,0 0-3954</inkml:trace>
-  <inkml:trace contextRef="#ctx0" brushRef="#br1" timeOffset="-35425.2315">623 2097 15847,'0'0'0,"0"0"-672,0 0 544,0 0 32,0 0-608,0 0-273,-7 32 177,28-44 800,10-3 1120,7 0-880,-2 5 0,-8 5-128,6 5-112,-13 0-256,-6 0-320,-1 5 48,0 2 528,1-2 48,-6 0 80,8-2-96,-3-1-32,0-2 80,-6 0-80,6 0 0,0 0 0,0 3-80,-4 4 80,7 0-80,-3 2 80,0 1 208,7 1 96,1-5-208,11-3 16,3-3-32,2 0-64,7 0-32,-2-7-144,-36 2-1248,3 2-2178</inkml:trace>
+  <inkml:trace contextRef="#ctx0" brushRef="#br1" timeOffset="-35425.2314">623 2097 15847,'0'0'0,"0"0"-672,0 0 544,0 0 32,0 0-608,0 0-273,-7 32 177,28-44 800,10-3 1120,7 0-880,-2 5 0,-8 5-128,6 5-112,-13 0-256,-6 0-320,-1 5 48,0 2 528,1-2 48,-6 0 80,8-2-96,-3-1-32,0-2 80,-6 0-80,6 0 0,0 0 0,0 3-80,-4 4 80,7 0-80,-3 2 80,0 1 208,7 1 96,1-5-208,11-3 16,3-3-32,2 0-64,7 0-32,-2-7-144,-36 2-1248,3 2-2178</inkml:trace>
   <inkml:trace contextRef="#ctx0" brushRef="#br1" timeOffset="-32382.7988">4817 2237 16247,'0'0'0,"0"0"-1728,0 0 1424,0 0 304,0 0 752,101 9-112,-49-21 145,-7-2-737,0 3 656,-9 3-320,-15 5-304,1 1-80,-3 2 0,-12 0-16,7 0-112,-7 0 208,8 0-80,-1 0 0,-4 0-240,11 0-336,3 0-593,-17 0-1760,0 0-2530</inkml:trace>
 </inkml:ink>
 </file>
@@ -270,13 +266,13 @@
   <inkml:trace contextRef="#ctx0" brushRef="#br0">4401 756 9780,'0'0'1889,"0"0"-1873,0 0 321,0 0-337,0 0 112,0 0-64,0 0 176,0-10 0,6 5 16,-6-2 352,5-2-288,1-3-272,2-4-32,3 2-176,1-2-224,1 1 336,-2 5-272,-5 0 336,0 8 160,-6 0-112,0 2-48,0 0-32,0 0 32,0 0-16,0 2-256,0 4 272,0 0 400,6-2-48,-1-2-144,1-2-208,6 0-288,-1 0-832,2-8 303,6 0 209,-7 0-128,-6 2 688,-1 4 48,-3 0 144,-2 2-144,0 0 0,0 0 0,0 0-64,0 0 128,0 3 496,0-2-80,4 1-256,1-2-96,1 0-128,2 0-768,3-8 368,8-2 288,-2 0-1729,-3 1 64,3 3 1265,-2 0-64,-3 4 480,3 0 96,-9 2 0,-1 0-113,-5 0 113,6 0 593,-6 0 671,0 0 305,0 0 224,0 0-721,0 0-784,0 0-207,6 0 239,5-2-96,2-4-224,8 0-737,6-4 225,-8 0-336,4 1 800,2 4-560,-14 0-321,1 3-143,-12 2 863,0 0 65,0 0 144,0 0 1297,0 0 192,0 2-577,0 3-47,0-2-257,0-1-160,0 0-448,0-2-256,5 0-2433,1 0 368,0 0-5011</inkml:trace>
   <inkml:trace contextRef="#ctx0" brushRef="#br0" timeOffset="-23157.7724">3372 1160 528,'0'0'9060,"0"0"-8836,0 0-127,0 0 703,0 0 208,0 0-127,0 0-289,6 2 16,-6-2-111,0 0-1,0 0 160,0 0-32,0 0-31,0 0 15,0 0-32,0 0-480,6 2 16,-6-1 144,6 2-16,-1-2-79,1 2 63,2-3-160,1 2 48,-1-2-16,5 2-16,-7-2-32,5 0 16,-5 0-32,-1 0-16,1 0 16,2 0 0,-2 0 16,3 0 0,3-7 0,-1 3-16,4-2-32,-9 1 16,5-1-16,-5 2-16,2-1 0,1 1 0,-3-2 0,2 0 16,-3 0-32,5 0 16,-1-2-48,-3 2 64,0 0 0,5 0-16,-5-2 16,-1 3 0,1-2 0,0 0-32,0 3 32,-1-2 0,3 2-16,-2-4 16,7 2 0,-7 0-16,5 0 16,-5-1 16,5-1-16,-5 0 0,6 2 0,-5-2 0,3 2 0,-3 0 0,7-2-32,-9 0 32,7 1-32,-1-3 0,-3 4 32,2-2 0,-3-2 0,4 0 0,3-2 0,-8 1-16,5 0 16,0 0 0,-3-1-16,1 4 0,-1-2 0,2 1 0,-3-1-64,5-1 64,1-2-80,4 2-64,-5-3 128,-5 1 0,5 1 32,-1-2 0,0 1-16,3-1 16,-3 0-48,1 2 0,-5 0-16,5 1 0,-3 1 64,-1-1 0,1-1 0,7-2-16,-5 0 16,6 0 0,-3 0 0,3 0 0,2 1 0,-2-1 0,2 0 0,-4 2 16,3-1-16,-3 1 0,2 0 16,-6 0-16,3-2 64,1 0-64,2 1 0,-2-3 16,2 0-16,0 0 0,3 2 0,-3 0 32,2 2-32,-2-1 0,-6 3 0,3 0 0,1 2 16,-3-1-16,3 0 32,-4 0-32,1-1 48,-5 0-48,4 0 0,1-2 0,3 1 0,0 0 0,2 0 0,-5 3 16,5-2-16,0 0 0,4 0 0,-4 0 0,2 0 0,-2 1-16,4-1 16,1 2-32,-3 0 16,1 0 16,-2 2-32,2 0 32,-2 0 0,-5-1 0,4 3 0,0-2 16,2 3-32,-1-2 16,-5 1 0,4 1-16,-2-2-16,6 3 16,-10 0 16,7 0-16,-1 0 16,0 0 0,-3 2 0,4 0-16,-6 0-16,-1 0 16,3 0 16,1 0 0,-3 0-16,3 0 16,-4 0 0,1 0-48,-1 4 15,-4-2 17,5 2 16,-3 1-48,7-2 48,-11 3 0,7-1 16,-1-1-16,-5 1 32,2-1-32,1 3 16,-1-2 0,1 4 33,-3-3-49,3 0 16,3 4-16,-6-1 16,5-2 0,-5 4 64,1 0-48,3 0 32,-3 2 48,3-2-32,-2 2 0,5 1 16,-1 0 16,-1-2 16,-4 2-96,3-2 112,-2 1 0,1 1-16,-1-2 16,-2 2-80,-1 0 112,3 3-96,-3 0-32,-5 0 96,6 1 16,0-1-95,-6 1 15,0 0 48,0 1 48,6-1-96,-6-1-32,0 1 16,0 1 32,0 0-96,0 1 48,0 1-32,0-2 16,0 2 64,0-1-80,0 1 16,0-2-32,-6-1 32,6 0-16,-6 0-16,0-1 0,1 0 32,-3-1-32,3 2 48,-3 0-32,2 1 0,-3 0-16,1-2 0,2 0 0,0-1 0,-5 0 0,6 3 0,-7-3 0,6 0 0,-7 0 16,6 1 0,1-1 0,-4 0 0,3 2-16,1 0 0,-6 0-16,7-1 32,-7 1 16,-1-2-32,5-1 0,-3-1 16,1 2 0,-1 0-32,3 1 0,-9-1-48,6 2 32,-3-2 32,3 0 0,-3 0-16,3-1 0,0-1 16,-1 2 0,1 1 32,-4-2-48,3-2 16,1 1 0,-1-3 0,7 1 16,-7-2 32,1-2-48,-4 0 0,5 0 32,-1-1-32,-1 0 16,4-1-16,-3 1 16,-1-3 0,1-1-16,6 0-16,-11-2-16,5-1 0,-4 0-128,7 0 96,-9 0 32,5 0-48,-8 0 0,2-1 32,3-4 48,2 0 32,1 0-16,-7 1 48,6-1-48,-2-2-16,-2-1 32,3 2-32,3-2-16,-8 0 16,6 0 0,-3-1 16,3 1 0,1-2-16,-5 0-16,4 0 16,2 0 32,-3 0 0,3 1-16,-1-1 32,1 3-32,-1-2 0,-1 1-16,2 0 16,-1-2-16,4 1 16,-3 0-16,0 2 0,-1-1 16,1 2 0,2 0-16,-3 2 16,1 0 64,-1-2-48,1 2-16,-1-2-16,1-1 16,-4 3-16,-1-2 0,3 2-64,-2-2 16,1 2 48,-3 0 0,2 1 32,3 0-16,1-1-16,-4 2 0,7-2 0,-3 2 0,-1 0 0,-3 0-48,4 2 32,-1-2 16,1 0 0,-1 0 0,1-1-16,0 3 16,-5 0 16,5-1 48,-4 1-64,1 0 32,-3 0-48,6 0 32,-8 0-16,5 0 48,3 0-32,0 0-16,-1 0 0,-5 0 0,2 0-16,-1 0 32,3 0-16,2 0 16,-1 0-16,1 0 0,-1 0 32,-1 0-16,5 0-16,-1 0 16,1 0 16,2 0-32,-5 0 0,5 0-16,-5 0 16,0 0 0,-3 0-16,3 0-16,3 0 32,-3 0 16,-1 0-16,1 0 16,-1 1-32,1-1 16,-4 0 0,5 0 0,-1 0 0,3 0 0,2 0 16,1 0 0,-1 0 0,-5 0-16,5 0-32,0 3 16,-3-3-16,-1 0 16,2 0 16,3 0 0,-1 0 16,-3 0 0,6 2-16,-2-2 0,-1 0 0,1 0 16,-1 0-16,0 2-48,0-2 32,-7 0 0,7 2-48,-1 0 64,1 0-16,0-2 0,1 0 16,-1 0-16,0 0 0,0 0 32,1 0-16,-1 0 0,0 0-32,1 0 32,-3 1-64,0-1 48,3 1 16,-1-1 0,2 2 16,2-2-16,-2 0 32,-1 0-48,3 0 16,-4 0-32,0 2-32,0 0-64,1-2 112,-1 2-16,0-2 0,1 0 32,5 0 32,-6 0-32,-2 0-16,6 0 16,-3 0 0,-1 0 32,0 0-16,0 0-16,1 0 0,-1 0 0,1 0-16,-1 0-16,0 0 32,6 0 48,-6 0-48,6 0 0,-5-2 48,5 2-48,-6 0 0,6 0 0,0 0 16,0 0 0,-6 0-16,6 0 16,0-2-16,0 2 0,-8-2-16,8 2-48,-1 0 32,-3 0 16,2 0-128,-2 0-32,2 0-64,2 0 48,-4-2-737,4 2-832,0-2-1456,0 2-1249</inkml:trace>
   <inkml:trace contextRef="#ctx0" brushRef="#br0" timeOffset="4704.5884">5180 644 4082,'0'0'2241,"0"0"-2129,0 0 1265,0 0 415,0 0-351,0 0-352,0 0-545,-2 2-144,2-2 272,0 0 145,-3 0 63,1 0-192,2 0-335,0 0-177,-6 0-16,6 0 240,0 0-272,-6 0 80,6 0-112,-6 0-96,6 0 0,-5 0-32,-1 0 32,-1 2 0,5 2-16,-2 0 16,2 1-16,-2 1-16,4 0 32,-2 0 64,2 0 32,0-1 32,0-2-48,0 0-80,2 0-48,4-2 48,7-1 32,-7 0-32,-1 0-176,1 0 176,0 0 112,0-1-112,-1-5-416,1 0 416,0 0 0,-4 0 0,-2-2-160,4 1 112,-4-1-128,0 0 0,0 2 128,0 2-160,0 0-561,0 4 769,-6 0 80,0 0 288,0 0-304,1 0-31,-1 6 143,6-2-16,-6 0-112,0 0 64,6 3-48,0-2 16,0 0-80,0 0 16,0-2-16,0 1 0,0-2-96,0 0-368,0-2-513,0 0-608,0 0-656,6 0-7619</inkml:trace>
-  <inkml:trace contextRef="#ctx0" brushRef="#br0" timeOffset="1284.6435">5203 218 6899,'0'0'2017,"0"0"-1505,0 0 1297,0 0-688,0 0-449,0 0-304,0-2-48,0 2 0,0 0 17,0 6 143,-6 3 128,-1 0-176,1 3-80,-3 2 17,7 1-33,-10 3 0,6 0-80,1 3-64,-1-1 48,6 0-128,-7 0 16,5-2 48,2-1-96,0-3 0,0-1-15,0-3-49,0-2 48,0-1-64,2-4-64,5 1-33,-1-4-31,5 0 96,-5 0-192,2 0 208,1-5 32,-1-4-32,1 1 16,-3-2-48,1-1 0,-2-1-240,4 0-400,-3-3 128,-1 0 175,1-2-223,-6-1-336,6 1 143,0 2 273,-6 0 368,0 3-240,0 1 288,0 2 112,0 1 32,0 2 32,0 0 32,0 1 336,0 1-224,0-2-64,-6 4 320,6-2-288,-6 1-63,6 0-33,-6 0 16,6 2-80,0-3 16,-5 4 0,5-1-32,0-2 0,0 3-304,-6-2-305,6 2 241,0-2 0,-8 2 16,8 0 96,-1 0 224,-4 0 16,5 0-64,0 0-145,-1 0-255,-3 0 96,2 2 320,-4 4 64,1 0 64,-1 0-64,0 2 112,2 0 48,-1-1 128,3-1-144,2 2 16,0-2-112,0 0-48,-6 0-80,6 2-144,0 1 0,0 2 112,-6 0-16,6 1 96,-6 2 0,6 0 32,0-1-32,-5-2 64,5-2-32,0 1 32,0-4-32,0-2-64,0 0-1313,-6-2 65,6 2 63,-7 1-399,5 0 927,-4-1 689,2 0 32,2 1 336,2-2 417,-4 0-161,4 0-48,0-3-96,0 2-175,0-1-193,0-1-48,0 0-32,4 0 128,-2 0-128,2 0 0,2 0-369,-4 0-95,5 0 336,-1-6 48,-1 0-352,-5-1-1169,0 3-224,0 0-160</inkml:trace>
+  <inkml:trace contextRef="#ctx0" brushRef="#br0" timeOffset="1284.6434">5203 218 6899,'0'0'2017,"0"0"-1505,0 0 1297,0 0-688,0 0-449,0 0-304,0-2-48,0 2 0,0 0 17,0 6 143,-6 3 128,-1 0-176,1 3-80,-3 2 17,7 1-33,-10 3 0,6 0-80,1 3-64,-1-1 48,6 0-128,-7 0 16,5-2 48,2-1-96,0-3 0,0-1-15,0-3-49,0-2 48,0-1-64,2-4-64,5 1-33,-1-4-31,5 0 96,-5 0-192,2 0 208,1-5 32,-1-4-32,1 1 16,-3-2-48,1-1 0,-2-1-240,4 0-400,-3-3 128,-1 0 175,1-2-223,-6-1-336,6 1 143,0 2 273,-6 0 368,0 3-240,0 1 288,0 2 112,0 1 32,0 2 32,0 0 32,0 1 336,0 1-224,0-2-64,-6 4 320,6-2-288,-6 1-63,6 0-33,-6 0 16,6 2-80,0-3 16,-5 4 0,5-1-32,0-2 0,0 3-304,-6-2-305,6 2 241,0-2 0,-8 2 16,8 0 96,-1 0 224,-4 0 16,5 0-64,0 0-145,-1 0-255,-3 0 96,2 2 320,-4 4 64,1 0 64,-1 0-64,0 2 112,2 0 48,-1-1 128,3-1-144,2 2 16,0-2-112,0 0-48,-6 0-80,6 2-144,0 1 0,0 2 112,-6 0-16,6 1 96,-6 2 0,6 0 32,0-1-32,-5-2 64,5-2-32,0 1 32,0-4-32,0-2-64,0 0-1313,-6-2 65,6 2 63,-7 1-399,5 0 927,-4-1 689,2 0 32,2 1 336,2-2 417,-4 0-161,4 0-48,0-3-96,0 2-175,0-1-193,0-1-48,0 0-32,4 0 128,-2 0-128,2 0 0,2 0-369,-4 0-95,5 0 336,-1-6 48,-1 0-352,-5-1-1169,0 3-224,0 0-160</inkml:trace>
   <inkml:trace contextRef="#ctx0" brushRef="#br0" timeOffset="2348.1522">5175 339 0,'0'0'752,"0"0"193,0 0-113,0 0-352,0 0-288,0 0-79,0 0 47,15-34 16,-15 33 320,0-1-160,0-1-192,0 1-144,2 0 0,-2 0-112,4-1 48,-3-2 32,3 1-272,-4 2-32,2 0 208,-2 0 128,0 2 560,0 0 288,0 0 113,0 0-1,0 0-31,0 0-929,0 0-305,0 0 305,0 0 97,0 4-33,0 4-32,0 0 80,-2 2 576,-2 2 64,3 0-47,-3 1-113,2-1-304,2-2 48,-4 2-144,2-1-16,2-1-64,-4-2 80,4 0-144,0-4 17,-2 0-65,2 0 48,0-2-16,0 0-32,0 0 0,0 0-64,0 2 64,-3-2 0,3-1 0,0 0 0,0-1-193,-2 2 97,2-2 96,0 0-32,0 0 32,0 0-64,0 0-32,0 0-416,0 0-464,0 0 479,2-6 497,3-2 128,1-2-128,0 0-944,-1-1 336,5 0 304,-4 0 96,0-1-417,3 2-639,-9 0 383,6 4 641,-6-3 240,0 4 160,5 0-48,-5 0-112,0 1 32,0 1-32,0-1-32,0 2 32,0-2 64,0 4 272,0 0 81,0 0 367,0 0 737,0 0-785,0 0-240,0 0-176,0 0-176,0 0 33,0 0-33,0 0 176,0-2-176,0 2-144,0 0 144,0 0 112,0 0-256,0 0-96,0 0-96,0 0 192,0 4 112,-5 1 0,5 1 96,-6-1-64,6 2 96,-8 0 208,7 2-175,-5-3 31,2 2 240,2 2-144,-4-2-240,2 0 48,3 1 32,-5-1-63,6-1-81,-4 0 112,2-1-112,-2 0-16,4 0-48,-2 0-32,-1 1 16,1-1-16,2 0 0,0-3 0,0 0 32,-6 0-32,6-3-32,0 2 32,0-1-144,0-1 64,0 0 80,0 0 0,0 0 0,0 0-80,0 0 64,0 0 16,0 0-208,0 0-241,0 0 1,0-1 240,0-5-416,6-2 576,-4-1 48,3-2-256,1 1-209,-2-2-319,2 2 192,-5 0-17,3 1 81,-2 1 144,2 0-320,-2 0 576,3 0 16,0 2-481,-4 0 177,7 0 288,-8 2-496,0 0 144,0-1 480,0 3-96,0-1-305,0-2 225,0 4 176,0-1 64,0-1 320,0 1 161,6 0-353,-6-2-192,0 2 0,0-2 0,0 0 0,5 0-64,-5 0-144,0-2-401,0 2 1,0 2 64,0 0 544,0 2 96,0-3 560,0 3 17,0 0-609,0-1-64,0 0-128,6-1 128,-6 1 32,0 1 0,0-1 32,0 1 112,0 0 272,0 0 192,0 0 433,0 0-897,0 0-176,0 0-352,0 0 352,0 0 144,0 0-32,0 0 48,0 0-160,0 0 16,0 1 112,0 0-96,0 2-32,0 1-272,0 0 272,0 0 208,0 2 112,0 0-112,0-2-80,0 0-80,-6 0-48,6 2 32,0-1 176,-5 1-128,5 0 32,-6-3 16,6 2-96,-8-2-16,8 0 16,0-3-32,0 0-816,0 0-2882</inkml:trace>
   <inkml:trace contextRef="#ctx0" brushRef="#br0" timeOffset="-16971.0182">1539 1391 4930,'-4'2'1505,"4"-2"-1409,0 0 768,0 0 209,-2 0 384,2 0-145,0 0-335,0 0-209,0 0 128,0 0 1,0 0 63,0 0-143,-4 0-337,4 0-272,-2 2-32,2-2-96,-5 0 16,5 2-64,-6-2-32,6 0 112,-6 0-48,6 0-16,-5 1 16,5-1 32,-6 0-16,0 0 32,0 0-96,6 0-16,-5 0 16,-5 0-16,6 0 16,-2 0 32,5-3 176,-5 1-111,0-4-17,3 2-16,-3-2-80,4 0-16,-4 0 0,-5 0 16,5-2 48,0-1-48,0-1 0,1 2 0,-5-2 0,4 0 0,1 0 0,-1-1-32,0 1 32,1 0 16,-1 0-16,0-2-16,0 2-80,6-3 0,-5 3 64,-1-2-49,1-1 65,5 2 16,-6-1 48,0 2-32,-2-1 0,6-1 1,-1 0-17,-3 0-17,4 0 1,-2 1 16,2 1 0,-2-2 65,-1 2-17,-1 0 64,4-2 80,-9 1-64,5-1-16,0 2-48,1-2-32,-1 0-16,0 1-16,-7-3 16,5 0-16,-1 0 0,3 0 32,-2-2-16,3 3 80,-1 1-32,0 1-32,0 0 48,1 1-32,-1-1-32,0 2 80,-7-2 0,7 1-64,-5 1-16,3-2 48,-3 1-32,5 0-32,-5-1 32,-1 2 16,1 1-16,-4-1 112,5 1 48,2 2-144,-1-2 16,1 2 32,-3-2-15,5 2 31,-5-2-64,-5-1-32,5 1-16,-1 0 16,1 0 16,-6 2 80,5-2-96,1 1 48,-8 1-32,6 0-16,1 0 0,1 2-16,0-2 16,-1 3 48,-1-2-48,1 3 0,1-2-16,-1 0 0,5 1 0,-5 0-32,1 1 32,-1 2 16,-6-2-16,4 0-16,3 2-32,-7 0 0,7 0 48,0 0 64,-8-2-48,7 2 32,1 0-32,3-1 0,-3 1-16,-1 0 0,-5 0 0,4 0 0,1 0-32,1 0 16,3 0 16,-3 0 0,-1 0 0,1 0 0,5 1 0,-7 3-16,5-2-32,-1 2 32,1 2 0,2 0 0,-5-2 16,5 2-48,-5 0 32,5 1-16,1 0 16,-9 2 0,6-1 16,3 0 0,-5 2 0,3 0-48,1-2 48,0 1 0,1-1-16,-1 1 0,0 0 0,0 1 16,1 0 0,-1 2 0,-4-2 0,6 0 0,-1 3 16,-1-1-16,1-2-16,-1 2 16,4 0-16,-4 1 16,0-1 0,1 2 16,-7-2-16,6 0 0,1 0-16,-1 1 16,-1-1 0,1 2 0,-2 0 16,2-2-16,-3 2 0,1-1 16,2-1-16,-5-1-32,6 0 32,-1 2 0,0 1 0,-7 0 0,5 0 0,-2 3 0,3-2 16,1 0-32,-5-1 16,5 0-32,0 1 16,1 0 0,-1 0 0,0-1 16,0 1-16,-3 0-16,3 2 32,0 1-32,3 0 32,1 0 0,-2 1-16,2-1 0,-2 1 16,2-1-16,2 0 16,0-2-32,0 0 15,0 1 1,0-1-16,0-2 16,0 3 0,2-3 16,4 2 0,0-2 0,-3 0 0,3 0-16,0 2 0,3-1-16,3-1 48,-6 2-64,5-2 96,1-1-48,-7 1 16,7-1-16,-1-1 16,4 3-16,-3-3 0,-6 0 0,5 0-16,0 0 16,1 0 0,-1 0 0,0-1 0,5 1 16,-5-2-16,-5-2-32,5 2 16,1-2 0,1 0 0,-2 0 16,9-2 0,-9 0-16,6-1 16,-5 1-16,1-1 16,2 0 0,1 1 0,0 0 16,-4 0 16,-1 0-32,3 0 0,-3 0-16,8 1 0,-7-3-48,-1 2 48,1-2 16,-5 0-64,5-2 16,-3 2 0,3 0 32,3-2 0,-4 0 0,1 0-128,-1-2-64,-5 0 144,5 0 48,-3 0 16,3 0-48,3 0-16,-3 0 32,0 0 32,1 0-32,-4-4-16,3 0-128,1 0-80,6-2 80,-6 0 160,-1-2 32,1-1 32,1 2 16,-2-1-64,5 1-128,-1-1-32,-3-2 144,5 2-16,-6-3 16,2 1 16,-1-2-32,1-2-80,-2 2-17,1-2-31,-1 0 112,-5 3-64,2-3-64,3 2 128,-1 0 32,-3-1-48,7 3 48,-3-1 16,-5 0 0,5 3-64,-5-2 64,0 1 0,-1 3-112,1-2 112,2-1-48,-3 3 48,1 0 0,8 0 0,-9 0-32,1 0 32,0-2 0,-1 2 0,7 0 16,-7-3-16,3 1 16,1 1-32,-1 1 16,4-3 0,1 1-16,-2 0 16,-5 2 0,6 0 0,-5 2-32,3-2 16,-5 3 16,3-1 0,2 1-48,-1 0 16,-3-1 0,5 0 16,-5 1 16,5 0-64,-3 0-48,2-2 96,-3 3-256,2 0 96,-1 0-160,6 0 304,-8 1-33,5 0 17,-6-1-80,1 0 80,2 0 0,1-2 0,3 0 16,-5-1 64,7 2-32,-9-1 0,1-1 16,0 3-32,0 1 32,-1-2-16,-5 3 32,6-1-32,-6-1 0,6 2 0,-4-1 0,4-1-32,-3 1 64,3-2-32,-4 3 16,2 0 16,-3 0-64,3 0-32,-2 0 64,2 0 64,-2 0-16,6-2-16,-3 2 96,1-2-15,-6 2-113,6-2 160,0 2-160,-6 0-64,5 0 48,1 0 16,-6 0 0,0 0-32,0 0-16,0 0-241,0 0-1039,0 0-2242,0 0-7651</inkml:trace>
-  <inkml:trace contextRef="#ctx0" brushRef="#br0" timeOffset="-5293.4378">504 973 1329,'0'0'640,"0"0"-112,0 0 353,0 0-385,0 0-128,0 0-224,0 0 96,0 0 272,0 0 97,0 0-1,0 0-192,0 0-240,0 0-48,0 0-128,2 0-32,2 0-32,-2 0-208,2 0 256,1 0 32,1-4 256,0 2-240,-4 0 32,2 2 48,-3 0-16,-1 0-64,0 0 288,0 0 337,0 0-337,0 0-160,0 0 384,8 0 241,-8 2-465,0 0-144,6 0-16,0 0-16,-1 0-144,1 0 224,0 0-160,0-2-32,-1 2 80,1-2-96,-6 0 48,6 2-32,-5-2-32,3 4 0,-4-2-64,2 0-240,2 2 304,-2 0 192,4-1-192,-1-3 0,9 1-48,-9-1-48,7 0-320,-7 0 16,7 0 368,-6 0 32,-4 0 0,1 0-176,-1 0 96,-2 0-64,4 0 47,-2 0-15,2 0 112,1 0 112,1 2-112,0-1 65,3-1-33,3 0 16,-6 0 16,-1 2-64,1-2 0,0 1-64,-1-1 64,3 0 0,3 0 0,5-1-785,-1-5 753,2-2-304,-5 2-560,1-1 832,-4 3 96,-7 2-32,2 2 32,-4 0 144,0 0 208,2 0 288,-2-1-144,4 0-528,1 1 144,5-2 177,-4-1 47,5 0-272,1 1-96,1-2 0,-1 4-288,-3 0-144,-1 0-529,-5 0-1328,-3 0-1409</inkml:trace>
+  <inkml:trace contextRef="#ctx0" brushRef="#br0" timeOffset="-5293.4377">504 973 1329,'0'0'640,"0"0"-112,0 0 353,0 0-385,0 0-128,0 0-224,0 0 96,0 0 272,0 0 97,0 0-1,0 0-192,0 0-240,0 0-48,0 0-128,2 0-32,2 0-32,-2 0-208,2 0 256,1 0 32,1-4 256,0 2-240,-4 0 32,2 2 48,-3 0-16,-1 0-64,0 0 288,0 0 337,0 0-337,0 0-160,0 0 384,8 0 241,-8 2-465,0 0-144,6 0-16,0 0-16,-1 0-144,1 0 224,0 0-160,0-2-32,-1 2 80,1-2-96,-6 0 48,6 2-32,-5-2-32,3 4 0,-4-2-64,2 0-240,2 2 304,-2 0 192,4-1-192,-1-3 0,9 1-48,-9-1-48,7 0-320,-7 0 16,7 0 368,-6 0 32,-4 0 0,1 0-176,-1 0 96,-2 0-64,4 0 47,-2 0-15,2 0 112,1 0 112,1 2-112,0-1 65,3-1-33,3 0 16,-6 0 16,-1 2-64,1-2 0,0 1-64,-1-1 64,3 0 0,3 0 0,5-1-785,-1-5 753,2-2-304,-5 2-560,1-1 832,-4 3 96,-7 2-32,2 2 32,-4 0 144,0 0 208,2 0 288,-2-1-144,4 0-528,1 1 144,5-2 177,-4-1 47,5 0-272,1 1-96,1-2 0,-1 4-288,-3 0-144,-1 0-529,-5 0-1328,-3 0-1409</inkml:trace>
   <inkml:trace contextRef="#ctx0" brushRef="#br0" timeOffset="-4199.8418">493 1178 10757,'0'0'0,"0"0"-368,0 0 368,0 0 960,55-34-624,-38 21 193,1 1-529,-7 4 80,-9 6-112,2 2 32,-4 0-465,0 0 449,0 4 16,1 2 929,-1 4-241,4-2-256,-2 0-384,4-2 0,-3-1-48,5-1-16,6-4-512,-3 0-112,6 0-433,-5-7-287,1-1 687,2 2 465,-7 4-112,-1 2 272,-7 0-480,6 0 192,-6 0 336,0 6 768,6-2-128,-6 0-367,0 1-161,6-3-112,-1-2 0,7 0-64,-5 0 48,10-5-289,8-4 257,-2-2-1953,-4 3 465,-4 4-497,-7 2 1649,-4 2-113,-4 0 497,0 0 305,0 6 2480,0-2-800,0 0-433,0-1-559,2-1-849,11-2-48,-7 0 32,5 0 0,6 0-112,-9 0-16,4 0-256,-12 0-2049,0 0-2433</inkml:trace>
   <inkml:trace contextRef="#ctx0" brushRef="#br1" timeOffset="-315140.3601">1700 1081 2369,'0'0'2257,"0"0"-1184,0 0 511,0 0 337,0 0-192,0 0-560,0 0-241,2-6-48,-2 6-175,0 0 127,0 0-160,0 0-239,0 0-193,0 0 64,0 0-64,0 0-208,0 0 32,0 0-32,0 0 32,0 0 16,0 0-16,0 0-64,0 0 0,0 0-16,0 0-16,0 0-160,0 0 0,0 4 192,0 3 176,0 1-48,-2 1-16,-4-2-48,6 2-48,0 1 0,-2 1 32,-3 0-32,5 1-16,-2-1 64,2-1-32,0-2-16,0 2 0,0 2 32,0-1-48,-5 3 48,5-3 0,0 2-48,0-1 0,0-1 0,0 2 0,0-1 32,0-2 0,0 4-32,0-3 0,0 2-16,-2-2 16,2 1 16,-4 1 64,1 2-32,-2 0-32,3-2 64,2 2-80,0-1 0,-7 1 112,7 0-48,-8-1 1,8 2-49,-7-3 112,7-1-128,0 3 0,-7-2 16,7 1-16,0-3 16,0 2-16,0-1 0,0-1 32,-7 0-32,7 0 32,0-1 0,0 0-32,0-1 0,0 0 0,0 3-16,0-1 16,-7 1-16,7-4-16,0 5 32,0-3 48,0 2-48,0-1 0,-7-2-16,7 1 16,0 1 16,0-1 16,0 0 0,0-2-32,0 2 16,0 1-16,0-1-16,0 2 16,0-2 0,0 3 0,0-1 16,0-1 0,0 1-16,0-1 32,0-2-32,0 5-48,0-4 0,0 1 48,0 0 32,0 0-16,0-1-16,0 2 16,0-4-16,0 4-16,0-1-32,0 2 48,0 1 0,0-1 48,0 0-48,0 0-16,0 1 16,0-3 0,0 4 0,0-2 16,0 2-32,0-2-112,0-3 128,0 3 0,0-1 0,0 1 16,0 0-16,0 1-48,0-1-16,0 0 48,0 0 16,0-1 0,0 1-48,0 0 16,0 2 32,0 1 16,0 2-16,0-1 0,-8-2 0,8 1 0,0-1-16,0 0 16,0-2 32,0 1-32,0-1-16,0 0 0,0 3-65,0-4 81,0 3 33,0-1-33,0-3 0,0 3-17,0-2 1,0 4 16,0-3-16,0-2-16,0 0 32,0-1 0,0 2 0,0-3 0,0 1 48,0 0-48,0-1 0,0 0 0,0 0-96,0-1 96,0 3 48,0-1-48,0 2 0,0 1-32,0-1 96,0 1-128,0-3 64,0 1 0,0-1 16,0-3-16,0 1 0,0 0 64,0-2-48,0 3-16,0-2 0,0 1-64,8-1 48,-8 1-80,0 3 48,0-1 48,0-1 80,0 2-80,0-2 48,0-1-48,0 0 0,0 2 16,7-2-16,-7 1 0,0-1-32,0 1 32,0 0 32,0-3-32,7 3-32,-7-3 32,0 2-80,0-1 80,0 0 0,0-1 0,0-1 16,0 2-16,7-2 32,-7 3-32,0 0 0,0-1 0,0 1 0,0-1 0,0 1 0,0-3 0,0 1-16,0-4-144,0 3 160,0-5-160,0 1-32,0-1-464,7 0-1057,-7-2-1696,0-5-1586</inkml:trace>
-  <inkml:trace contextRef="#ctx0" brushRef="#br1" timeOffset="-312514.1408">1754 1073 3169,'0'0'2065,"0"0"-1392,0 0 1184,0 0 304,0 0-145,0 0-559,0 0-160,0 0-113,0 0-399,0 0-209,0 0-96,0 0-128,0 0-32,0 0-111,0 0-97,0 0-64,0 0-48,0 0-112,0 0-1,0 0-127,0 0 16,0 0 208,15 0 16,-8 0-16,7 0 16,0 0 48,-2 0 80,2 0-64,1 0-48,-1 0 16,0 0-32,1 0 48,-1 0-32,5 0-16,-5 0 48,0 0-48,1 0 0,-1 0 32,3 0-16,-3 0 16,3 0-32,-3 0-48,0 0 48,1 0 48,-1 0-16,-7 0 49,2 0-1,-1 0-64,3 0-16,-3-1 0,3 1 48,-3 0-32,-1 0 16,7 0 0,0 0 16,-4 0 16,4-1-32,5-2-16,8 2 16,-6-3 0,1 1 16,-6 3 0,-2 0-32,1-2-16,1 2 16,-8 0-16,-1 0-16,0 0 16,-7 0 16,14 0 32,-7 0-48,7 0-16,3 0 16,7 0 48,-3-1-16,1 0-32,-5-2-16,2 3 16,-5 0 32,5-1-32,-5 1-16,-7 0 16,1 0 0,6 0 16,-7 0-16,7 0 80,0 0-80,3 0-16,7 0 16,-10 0 0,0 0 16,1 0-16,-6 0 0,3 0-16,-5 0 32,1 0-16,3 0 0,-4 0 16,1 0-16,7 0 16,-8 0-16,0 0 0,3 0 16,2 0-16,2 0 0,-5 0-32,8 0 32,-2 0 0,-8 0 0,0 0 0,0 0 16,0 0-16,0 1 0,1-1 0,-1 0 32,-1 0-32,4 0 0,2 2-16,0-2 16,2 0 0,0 0-16,1 0 16,-1 0-16,-7 0 32,3 0-16,-3 0 16,0 0-16,0 0 0,1 0 0,1 0 0,-2 0 0,0 0 0,0 0 0,0 0 0,8 0-16,-8 0 0,0 0-16,2 0 32,-1 0 0,-1 0 0,0 0-32,-7 0-16,5 0-64,-5 0 16,0 0 80,0 0 16,0 0 32,0 0 16,0 0-32,0 0-16,0 0 16,0 0-16,0 0 0,0 0-16,0 0-16,0 0-64,0 0 16,0 0 0,0 0-112,0 0 192,0 0-80,0 0-65,0 0 97,0 0 0,0 0-32,0 0-32,0 1 112,0 3 48,0 2 0,0 0 48,0 1 32,0-1-79,0 2 15,0 0-64,0-1 48,0 1-32,0 2 0,0-2 0,0 2 64,0 0-80,0-1 0,0 0 64,0 1-64,0 0 32,0-2-32,0 1 0,0-1-32,0 0 16,0 3 16,0-2 0,0 1 0,0 1 0,0-1 16,0 0 16,0 1 80,0-2-16,0 2-48,0-2-32,0 1-16,0-2 0,0 3 16,0-1 48,0-1-64,0 1 48,0 1-48,0 0 0,0 0-64,0 1 16,0-1 32,0 0 0,0 1 32,0-2 16,-5 1 0,5-1 32,0 2-64,-2-1 64,2 0-32,0-2-16,0 4 0,0 0-16,-5-1 0,5 3 0,0-2 0,0 2 16,0-3-16,0 1 32,-2-1-32,2-2 0,-5 2 0,5 1 48,0 0-48,0 0 0,0 0 0,0-3 32,0 1 0,0-3-16,0 1-16,0 1 32,0 0-32,0 0 16,0 2-16,0-1 0,0 1-16,0-1 16,0 4 0,0-2 0,0-1 0,0-1 0,0-1 0,5 0 16,-5-1-16,2 0 16,-2-2-16,5 1 0,-5 3 16,0-2-32,2 1-16,-2 2 32,0-1 16,5 1 0,-5 1 0,2 1-32,-2-2 16,0 3 0,0-2 32,0 2-16,10 0-32,-10 1 16,0-1 0,0 0 48,0 2-48,7-1 32,-7-4-16,0 4 16,0-1-32,0 1 0,0 0 0,0 1-16,0-2 32,0 0-32,0 2 32,0-1 0,0-4-16,0 4 0,0-1-16,0 0 16,0 0 16,0 0 0,0 1 16,0-4-32,0 4-16,0-2 0,0 0 0,0 1 0,0 0 16,0 0 32,0 3-16,0-2 0,0 0-16,0 1 0,0-3 0,0 2 0,0-1 32,0-1-48,0-1 16,0 0 0,0-1 16,0 0 0,0-2-16,0 2 0,0-2 0,0 0 0,0 1 48,0-1-48,0 0 0,0 3-64,0-1 64,-7 1 0,7-1 48,0 1-48,0-3 16,-10 1-16,10-1 16,0 3-16,0-3 0,0-1-16,0 1 32,0-3-16,0-1 0,0-1 0,0 1 0,0 1 0,0 1 0,0-1 0,0 0 16,0-1 0,0 2 0,0 0 0,0 0-16,0 1 0,0 1 0,0-2 0,0 0-32,0-1 32,0 1 0,0-1 16,0 1-64,0 0 96,0 1-48,0 0 0,0-2-16,0 0 16,0 0 0,0-1 0,0-3 0,0 3 0,0-3 0,-2 3 32,2 1-32,0-1 0,0 1 16,0-2-16,0-2 0,0 1-32,-5-1 32,5 0 16,0-1-16,0-1 0,0 1 16,0-2 0,0 3-32,0-1 0,0 0 16,0-1-16,0 1 0,0 2 16,-2 0 0,2 0-48,0-1 32,0 0-64,0 0-48,0-1-112,0 1 0,0-1-112,0 1 48,-5 1-33,5-1-111,0-1-416,0-2-321,0 0-624,0 0-2913</inkml:trace>
+  <inkml:trace contextRef="#ctx0" brushRef="#br1" timeOffset="-312514.1407">1754 1073 3169,'0'0'2065,"0"0"-1392,0 0 1184,0 0 304,0 0-145,0 0-559,0 0-160,0 0-113,0 0-399,0 0-209,0 0-96,0 0-128,0 0-32,0 0-111,0 0-97,0 0-64,0 0-48,0 0-112,0 0-1,0 0-127,0 0 16,0 0 208,15 0 16,-8 0-16,7 0 16,0 0 48,-2 0 80,2 0-64,1 0-48,-1 0 16,0 0-32,1 0 48,-1 0-32,5 0-16,-5 0 48,0 0-48,1 0 0,-1 0 32,3 0-16,-3 0 16,3 0-32,-3 0-48,0 0 48,1 0 48,-1 0-16,-7 0 49,2 0-1,-1 0-64,3 0-16,-3-1 0,3 1 48,-3 0-32,-1 0 16,7 0 0,0 0 16,-4 0 16,4-1-32,5-2-16,8 2 16,-6-3 0,1 1 16,-6 3 0,-2 0-32,1-2-16,1 2 16,-8 0-16,-1 0-16,0 0 16,-7 0 16,14 0 32,-7 0-48,7 0-16,3 0 16,7 0 48,-3-1-16,1 0-32,-5-2-16,2 3 16,-5 0 32,5-1-32,-5 1-16,-7 0 16,1 0 0,6 0 16,-7 0-16,7 0 80,0 0-80,3 0-16,7 0 16,-10 0 0,0 0 16,1 0-16,-6 0 0,3 0-16,-5 0 32,1 0-16,3 0 0,-4 0 16,1 0-16,7 0 16,-8 0-16,0 0 0,3 0 16,2 0-16,2 0 0,-5 0-32,8 0 32,-2 0 0,-8 0 0,0 0 0,0 0 16,0 0-16,0 1 0,1-1 0,-1 0 32,-1 0-32,4 0 0,2 2-16,0-2 16,2 0 0,0 0-16,1 0 16,-1 0-16,-7 0 32,3 0-16,-3 0 16,0 0-16,0 0 0,1 0 0,1 0 0,-2 0 0,0 0 0,0 0 0,0 0 0,8 0-16,-8 0 0,0 0-16,2 0 32,-1 0 0,-1 0 0,0 0-32,-7 0-16,5 0-64,-5 0 16,0 0 80,0 0 16,0 0 32,0 0 16,0 0-32,0 0-16,0 0 16,0 0-16,0 0 0,0 0-16,0 0-16,0 0-64,0 0 16,0 0 0,0 0-112,0 0 192,0 0-80,0 0-65,0 0 97,0 0 0,0 0-32,0 0-32,0 1 112,0 3 48,0 2 0,0 0 48,0 1 32,0-1-79,0 2 15,0 0-64,0-1 48,0 1-32,0 2 0,0-2 0,0 2 64,0 0-80,0-1 0,0 0 64,0 1-64,0 0 32,0-2-32,0 1 0,0-1-32,0 0 16,0 3 16,0-2 0,0 1 0,0 1 0,0-1 16,0 0 16,0 1 80,0-2-16,0 2-48,0-2-32,0 1-16,0-2 0,0 3 16,0-1 48,0-1-64,0 1 48,0 1-48,0 0 0,0 0-64,0 1 16,0-1 32,0 0 0,0 1 32,0-2 16,-5 1 0,5-1 32,0 2-64,-2-1 64,2 0-32,0-2-16,0 4 0,0 0-16,-5-1 0,5 3 0,0-2 0,0 2 16,0-3-16,0 1 32,-2-1-32,2-2 0,-5 2 0,5 1 48,0 0-48,0 0 0,0 0 0,0-3 32,0 1 0,0-3-16,0 1-16,0 1 32,0 0-32,0 0 16,0 2-16,0-1 0,0 1-16,0-1 16,0 4 0,0-2 0,0-1 0,0-1 0,0-1 0,5 0 16,-5-1-16,2 0 16,-2-2-16,5 1 0,-5 3 16,0-2-32,2 1-16,-2 2 32,0-1 16,5 1 0,-5 1 0,2 1-32,-2-2 16,0 3 0,0-2 32,0 2-16,10 0-32,-10 1 16,0-1 0,0 0 48,0 2-48,7-1 32,-7-4-16,0 4 16,0-1-32,0 1 0,0 0 0,0 1-16,0-2 32,0 0-32,0 2 32,0-1 0,0-4-16,0 4 0,0-1-16,0 0 16,0 0 16,0 0 0,0 1 16,0-4-32,0 4-16,0-2 0,0 0 0,0 1 0,0 0 16,0 0 32,0 3-16,0-2 0,0 0-16,0 1 0,0-3 0,0 2 0,0-1 32,0-1-48,0-1 16,0 0 0,0-1 16,0 0 0,0-2-16,0 2 0,0-2 0,0 0 0,0 1 48,0-1-48,0 0 0,0 3-64,0-1 64,-7 1 0,7-1 48,0 1-48,0-3 16,-10 1-16,10-1 16,0 3-16,0-3 0,0-1-16,0 1 32,0-3-16,0-1 0,0-1 0,0 1 0,0 1 0,0 1 0,0-1 0,0 0 16,0-1 0,0 2 0,0 0 0,0 0-16,0 1 0,0 1 0,0-2 0,0 0-32,0-1 32,0 1 0,0-1 16,0 1-64,0 0 96,0 1-48,0 0 0,0-2-16,0 0 16,0 0 0,0-1 0,0-3 0,0 3 0,0-3 0,-2 3 32,2 1-32,0-1 0,0 1 16,0-2-16,0-2 0,0 1-32,-5-1 32,5 0 16,0-1-16,0-1 0,0 1 16,0-2 0,0 3-32,0-1 0,0 0 16,0-1-16,0 1 0,0 2 16,-2 0 0,2 0-48,0-1 32,0 0-64,0 0-48,0-1-112,0 1 0,0-1-112,0 1 48,-5 1-33,5-1-111,0-1-416,0-2-321,0 0-624,0 0-2913</inkml:trace>
   <inkml:trace contextRef="#ctx0" brushRef="#br1" timeOffset="-308517.4398">1692 3248 2929,'0'0'1457,"0"0"-513,0 0 529,0 0-753,0 0 433,0 0 336,0 0-273,0 0-624,0 0-303,0 0-33,0 0 48,0 0-128,0 0-176,0-1-48,0 1-80,-5 0 96,5 0 32,-2 0 0,-3 0 0,5 0-32,-2 0 32,2 0 192,0 0 0,-4 0 16,4-1-48,0 1 80,0-1 192,0 1 177,0 0-209,0 0-272,0 0 0,0 0-32,0-2-96,0 2-128,0 0-64,0 0-128,0 0 32,0 0 272,6 0 16,1 0 0,0 0 48,10 0 80,-9 0 16,6 0-32,-7 0-112,7 0 48,1 0 368,-6 2-176,5-2 144,-2 0-320,0 0-64,2 1 0,-7-1 0,8 1 160,-1 0-111,-4-1 127,4 0-176,0 0 0,3 0 96,-3 0 32,0 0-48,-6 0 48,6 0-64,-7 0 16,2 0 16,6 0 32,-3 0 64,7 0-96,-5 0-64,-7 0 64,8 0 0,-8 0-96,2 0 32,3 0 32,-2 0-64,1 0 32,-1 0 0,7 0 64,-3 0-80,0 0 32,1 0 48,-6 0-80,3 0-16,2 0 0,-4 0 0,7 0 0,4 0 0,-7 0 96,3 0 16,2 0-96,7 0 17,-11 0-1,-1 0-16,0 0-16,0 2 0,-7 1-177,3 0 145,2-1 32,7 1 64,-12 0 0,7-1-31,8 1-33,-8-2 80,8 0 32,4-1-80,-5 2 0,1 1-32,-6-2 128,4 1-112,-4 0-16,1 0 80,-3-1-16,0-1-64,0 2 64,-4-2-32,2 0 112,-2 3-48,1-3 16,-1 2-32,6-1-48,-8 1-32,-1 0 16,1-1-32,-1 1 32,7-2-32,-6 0 64,6 0-48,0 0 48,5 0 16,-4 0-32,-8 0-32,0 0-16,0 0 0,0 0 0,0 3 16,-7-3 0,8 0 32,-1 0 0,2 0-16,3 0 96,7 0-96,-5 0 96,0 0-96,-6 0 0,6 0-16,-7 0-16,-4 0 16,4 0 16,-3 0-16,4 0 48,-1 0-48,-5 0 0,5 0 0,-2 0 0,7 0 0,-5 0 48,0-3-32,0 3-16,0 0 0,1-3 32,-1 1-48,0 0 16,-5 2 0,5-1 0,0-1 0,1 2 0,-1-3 16,-2 1 16,-5 2-48,2 0 32,-2 0 0,0 0 80,0 0-96,0 0-304,0 0-32,0 0-544,0 0-1393,0 0-2674</inkml:trace>
   <inkml:trace contextRef="#ctx0" brushRef="#br1" timeOffset="-301244.7826">2111 2838 16247,'0'0'0,"0"0"-1728,0 0 1424,0 0 304,0 0 752,101 9-112,-49-21 145,-7-2-737,0 3 656,-9 3-320,-15 5-304,1 1-80,-3 2 0,-12 0-16,7 0-112,-7 0 208,8 0-80,-1 0 0,-4 0-240,11 0-336,3 0-593,-17 0-1760,0 0-2530</inkml:trace>
   <inkml:trace contextRef="#ctx0" brushRef="#br1" timeOffset="-303306.8375">2033 1433 8020,'0'0'32,"0"0"1056,66-24 673,-37 17-977,2 0-111,-2 2-369,-5 3-288,-3 2 16,3 0-64,-3 0 64,-6 0-32,-6 0 0,3 0 48,-5 0 16,2 2-16,8 1-48,-10-1-48,1 4-112,6-1 160,-7-1 96,7 1 0,0-2 112,3 0 112,14-1-272,-2 0 144,-5-1-144,4-1 0,3 0 0,5 0-48,-13 0-288,4-6 80,-8 1 416,-5 3-176,-7 2 16,0 0-48,0 0-336,0 0 336,3 0 0,9-1-400,-16-1-1345,4 1-1745</inkml:trace>
@@ -8105,374 +8101,6 @@
         </p:nvSpPr>
         <p:spPr>
           <a:xfrm>
-            <a:off x="3322979" y="200303"/>
-            <a:ext cx="5761963" cy="769441"/>
-          </a:xfrm>
-          <a:prstGeom prst="rect">
-            <a:avLst/>
-          </a:prstGeom>
-          <a:noFill/>
-        </p:spPr>
-        <p:txBody>
-          <a:bodyPr wrap="none" rtlCol="0">
-            <a:spAutoFit/>
-          </a:bodyPr>
-          <a:lstStyle/>
-          <a:p>
-            <a:pPr algn="ctr"/>
-            <a:r>
-              <a:rPr lang="de-DE" sz="4400" b="1" dirty="0" err="1" smtClean="0">
-                <a:solidFill>
-                  <a:srgbClr val="C00000"/>
-                </a:solidFill>
-              </a:rPr>
-              <a:t>Decompose</a:t>
-            </a:r>
-            <a:r>
-              <a:rPr lang="de-DE" sz="4400" b="1" dirty="0" smtClean="0">
-                <a:solidFill>
-                  <a:srgbClr val="C00000"/>
-                </a:solidFill>
-              </a:rPr>
-              <a:t> </a:t>
-            </a:r>
-            <a:r>
-              <a:rPr lang="de-DE" sz="4400" b="1" dirty="0" err="1" smtClean="0">
-                <a:solidFill>
-                  <a:srgbClr val="C00000"/>
-                </a:solidFill>
-              </a:rPr>
-              <a:t>Conditional</a:t>
-            </a:r>
-            <a:endParaRPr lang="de-DE" sz="4400" b="1" dirty="0">
-              <a:solidFill>
-                <a:srgbClr val="C00000"/>
-              </a:solidFill>
-            </a:endParaRPr>
-          </a:p>
-        </p:txBody>
-      </p:sp>
-    </p:spTree>
-    <p:extLst>
-      <p:ext uri="{BB962C8B-B14F-4D97-AF65-F5344CB8AC3E}">
-        <p14:creationId xmlns:p14="http://schemas.microsoft.com/office/powerpoint/2010/main" val="2801886571"/>
-      </p:ext>
-    </p:extLst>
-  </p:cSld>
-  <p:clrMapOvr>
-    <a:masterClrMapping/>
-  </p:clrMapOvr>
-  <p:timing>
-    <p:tnLst>
-      <p:par>
-        <p:cTn id="1" dur="indefinite" restart="never" nodeType="tmRoot"/>
-      </p:par>
-    </p:tnLst>
-  </p:timing>
-</p:sld>
-</file>
-
-<file path=ppt/slides/slide41.xml><?xml version="1.0" encoding="utf-8"?>
-<p:sld xmlns:a="http://schemas.openxmlformats.org/drawingml/2006/main" xmlns:r="http://schemas.openxmlformats.org/officeDocument/2006/relationships" xmlns:p="http://schemas.openxmlformats.org/presentationml/2006/main">
-  <p:cSld>
-    <p:spTree>
-      <p:nvGrpSpPr>
-        <p:cNvPr id="1" name=""/>
-        <p:cNvGrpSpPr/>
-        <p:nvPr/>
-      </p:nvGrpSpPr>
-      <p:grpSpPr>
-        <a:xfrm>
-          <a:off x="0" y="0"/>
-          <a:ext cx="0" cy="0"/>
-          <a:chOff x="0" y="0"/>
-          <a:chExt cx="0" cy="0"/>
-        </a:xfrm>
-      </p:grpSpPr>
-      <p:sp>
-        <p:nvSpPr>
-          <p:cNvPr id="7" name="Textfeld 6"/>
-          <p:cNvSpPr txBox="1"/>
-          <p:nvPr/>
-        </p:nvSpPr>
-        <p:spPr>
-          <a:xfrm>
-            <a:off x="3322979" y="200303"/>
-            <a:ext cx="5761963" cy="769441"/>
-          </a:xfrm>
-          <a:prstGeom prst="rect">
-            <a:avLst/>
-          </a:prstGeom>
-          <a:noFill/>
-        </p:spPr>
-        <p:txBody>
-          <a:bodyPr wrap="none" rtlCol="0">
-            <a:spAutoFit/>
-          </a:bodyPr>
-          <a:lstStyle/>
-          <a:p>
-            <a:pPr algn="ctr"/>
-            <a:r>
-              <a:rPr lang="de-DE" sz="4400" b="1" dirty="0" err="1" smtClean="0">
-                <a:solidFill>
-                  <a:srgbClr val="C00000"/>
-                </a:solidFill>
-              </a:rPr>
-              <a:t>Decompose</a:t>
-            </a:r>
-            <a:r>
-              <a:rPr lang="de-DE" sz="4400" b="1" dirty="0" smtClean="0">
-                <a:solidFill>
-                  <a:srgbClr val="C00000"/>
-                </a:solidFill>
-              </a:rPr>
-              <a:t> </a:t>
-            </a:r>
-            <a:r>
-              <a:rPr lang="de-DE" sz="4400" b="1" dirty="0" err="1" smtClean="0">
-                <a:solidFill>
-                  <a:srgbClr val="C00000"/>
-                </a:solidFill>
-              </a:rPr>
-              <a:t>Conditional</a:t>
-            </a:r>
-            <a:endParaRPr lang="de-DE" sz="4400" b="1" dirty="0">
-              <a:solidFill>
-                <a:srgbClr val="C00000"/>
-              </a:solidFill>
-            </a:endParaRPr>
-          </a:p>
-        </p:txBody>
-      </p:sp>
-    </p:spTree>
-    <p:extLst>
-      <p:ext uri="{BB962C8B-B14F-4D97-AF65-F5344CB8AC3E}">
-        <p14:creationId xmlns:p14="http://schemas.microsoft.com/office/powerpoint/2010/main" val="2451633306"/>
-      </p:ext>
-    </p:extLst>
-  </p:cSld>
-  <p:clrMapOvr>
-    <a:masterClrMapping/>
-  </p:clrMapOvr>
-  <p:timing>
-    <p:tnLst>
-      <p:par>
-        <p:cTn id="1" dur="indefinite" restart="never" nodeType="tmRoot"/>
-      </p:par>
-    </p:tnLst>
-  </p:timing>
-</p:sld>
-</file>
-
-<file path=ppt/slides/slide42.xml><?xml version="1.0" encoding="utf-8"?>
-<p:sld xmlns:a="http://schemas.openxmlformats.org/drawingml/2006/main" xmlns:r="http://schemas.openxmlformats.org/officeDocument/2006/relationships" xmlns:p="http://schemas.openxmlformats.org/presentationml/2006/main">
-  <p:cSld>
-    <p:spTree>
-      <p:nvGrpSpPr>
-        <p:cNvPr id="1" name=""/>
-        <p:cNvGrpSpPr/>
-        <p:nvPr/>
-      </p:nvGrpSpPr>
-      <p:grpSpPr>
-        <a:xfrm>
-          <a:off x="0" y="0"/>
-          <a:ext cx="0" cy="0"/>
-          <a:chOff x="0" y="0"/>
-          <a:chExt cx="0" cy="0"/>
-        </a:xfrm>
-      </p:grpSpPr>
-      <p:sp>
-        <p:nvSpPr>
-          <p:cNvPr id="7" name="Textfeld 6"/>
-          <p:cNvSpPr txBox="1"/>
-          <p:nvPr/>
-        </p:nvSpPr>
-        <p:spPr>
-          <a:xfrm>
-            <a:off x="3322979" y="200303"/>
-            <a:ext cx="5761963" cy="769441"/>
-          </a:xfrm>
-          <a:prstGeom prst="rect">
-            <a:avLst/>
-          </a:prstGeom>
-          <a:noFill/>
-        </p:spPr>
-        <p:txBody>
-          <a:bodyPr wrap="none" rtlCol="0">
-            <a:spAutoFit/>
-          </a:bodyPr>
-          <a:lstStyle/>
-          <a:p>
-            <a:pPr algn="ctr"/>
-            <a:r>
-              <a:rPr lang="de-DE" sz="4400" b="1" dirty="0" err="1" smtClean="0">
-                <a:solidFill>
-                  <a:srgbClr val="C00000"/>
-                </a:solidFill>
-              </a:rPr>
-              <a:t>Decompose</a:t>
-            </a:r>
-            <a:r>
-              <a:rPr lang="de-DE" sz="4400" b="1" dirty="0" smtClean="0">
-                <a:solidFill>
-                  <a:srgbClr val="C00000"/>
-                </a:solidFill>
-              </a:rPr>
-              <a:t> </a:t>
-            </a:r>
-            <a:r>
-              <a:rPr lang="de-DE" sz="4400" b="1" dirty="0" err="1" smtClean="0">
-                <a:solidFill>
-                  <a:srgbClr val="C00000"/>
-                </a:solidFill>
-              </a:rPr>
-              <a:t>Conditional</a:t>
-            </a:r>
-            <a:endParaRPr lang="de-DE" sz="4400" b="1" dirty="0">
-              <a:solidFill>
-                <a:srgbClr val="C00000"/>
-              </a:solidFill>
-            </a:endParaRPr>
-          </a:p>
-        </p:txBody>
-      </p:sp>
-    </p:spTree>
-    <p:extLst>
-      <p:ext uri="{BB962C8B-B14F-4D97-AF65-F5344CB8AC3E}">
-        <p14:creationId xmlns:p14="http://schemas.microsoft.com/office/powerpoint/2010/main" val="2635531226"/>
-      </p:ext>
-    </p:extLst>
-  </p:cSld>
-  <p:clrMapOvr>
-    <a:masterClrMapping/>
-  </p:clrMapOvr>
-  <p:timing>
-    <p:tnLst>
-      <p:par>
-        <p:cTn id="1" dur="indefinite" restart="never" nodeType="tmRoot"/>
-      </p:par>
-    </p:tnLst>
-  </p:timing>
-</p:sld>
-</file>
-
-<file path=ppt/slides/slide43.xml><?xml version="1.0" encoding="utf-8"?>
-<p:sld xmlns:a="http://schemas.openxmlformats.org/drawingml/2006/main" xmlns:r="http://schemas.openxmlformats.org/officeDocument/2006/relationships" xmlns:p="http://schemas.openxmlformats.org/presentationml/2006/main">
-  <p:cSld>
-    <p:spTree>
-      <p:nvGrpSpPr>
-        <p:cNvPr id="1" name=""/>
-        <p:cNvGrpSpPr/>
-        <p:nvPr/>
-      </p:nvGrpSpPr>
-      <p:grpSpPr>
-        <a:xfrm>
-          <a:off x="0" y="0"/>
-          <a:ext cx="0" cy="0"/>
-          <a:chOff x="0" y="0"/>
-          <a:chExt cx="0" cy="0"/>
-        </a:xfrm>
-      </p:grpSpPr>
-      <p:sp>
-        <p:nvSpPr>
-          <p:cNvPr id="7" name="Textfeld 6"/>
-          <p:cNvSpPr txBox="1"/>
-          <p:nvPr/>
-        </p:nvSpPr>
-        <p:spPr>
-          <a:xfrm>
-            <a:off x="3322979" y="200303"/>
-            <a:ext cx="5761963" cy="769441"/>
-          </a:xfrm>
-          <a:prstGeom prst="rect">
-            <a:avLst/>
-          </a:prstGeom>
-          <a:noFill/>
-        </p:spPr>
-        <p:txBody>
-          <a:bodyPr wrap="none" rtlCol="0">
-            <a:spAutoFit/>
-          </a:bodyPr>
-          <a:lstStyle/>
-          <a:p>
-            <a:pPr algn="ctr"/>
-            <a:r>
-              <a:rPr lang="de-DE" sz="4400" b="1" dirty="0" err="1" smtClean="0">
-                <a:solidFill>
-                  <a:srgbClr val="C00000"/>
-                </a:solidFill>
-              </a:rPr>
-              <a:t>Decompose</a:t>
-            </a:r>
-            <a:r>
-              <a:rPr lang="de-DE" sz="4400" b="1" dirty="0" smtClean="0">
-                <a:solidFill>
-                  <a:srgbClr val="C00000"/>
-                </a:solidFill>
-              </a:rPr>
-              <a:t> </a:t>
-            </a:r>
-            <a:r>
-              <a:rPr lang="de-DE" sz="4400" b="1" dirty="0" err="1" smtClean="0">
-                <a:solidFill>
-                  <a:srgbClr val="C00000"/>
-                </a:solidFill>
-              </a:rPr>
-              <a:t>Conditional</a:t>
-            </a:r>
-            <a:endParaRPr lang="de-DE" sz="4400" b="1" dirty="0">
-              <a:solidFill>
-                <a:srgbClr val="C00000"/>
-              </a:solidFill>
-            </a:endParaRPr>
-          </a:p>
-        </p:txBody>
-      </p:sp>
-    </p:spTree>
-    <p:extLst>
-      <p:ext uri="{BB962C8B-B14F-4D97-AF65-F5344CB8AC3E}">
-        <p14:creationId xmlns:p14="http://schemas.microsoft.com/office/powerpoint/2010/main" val="385516898"/>
-      </p:ext>
-    </p:extLst>
-  </p:cSld>
-  <p:clrMapOvr>
-    <a:masterClrMapping/>
-  </p:clrMapOvr>
-  <p:timing>
-    <p:tnLst>
-      <p:par>
-        <p:cTn id="1" dur="indefinite" restart="never" nodeType="tmRoot"/>
-      </p:par>
-    </p:tnLst>
-  </p:timing>
-</p:sld>
-</file>
-
-<file path=ppt/slides/slide44.xml><?xml version="1.0" encoding="utf-8"?>
-<p:sld xmlns:a="http://schemas.openxmlformats.org/drawingml/2006/main" xmlns:r="http://schemas.openxmlformats.org/officeDocument/2006/relationships" xmlns:p="http://schemas.openxmlformats.org/presentationml/2006/main">
-  <p:cSld>
-    <p:spTree>
-      <p:nvGrpSpPr>
-        <p:cNvPr id="1" name=""/>
-        <p:cNvGrpSpPr/>
-        <p:nvPr/>
-      </p:nvGrpSpPr>
-      <p:grpSpPr>
-        <a:xfrm>
-          <a:off x="0" y="0"/>
-          <a:ext cx="0" cy="0"/>
-          <a:chOff x="0" y="0"/>
-          <a:chExt cx="0" cy="0"/>
-        </a:xfrm>
-      </p:grpSpPr>
-      <p:sp>
-        <p:nvSpPr>
-          <p:cNvPr id="7" name="Textfeld 6"/>
-          <p:cNvSpPr txBox="1"/>
-          <p:nvPr/>
-        </p:nvSpPr>
-        <p:spPr>
-          <a:xfrm>
             <a:off x="4554424" y="3007767"/>
             <a:ext cx="3083152" cy="769441"/>
           </a:xfrm>
@@ -8572,7 +8200,7 @@
 </p:sld>
 </file>
 
-<file path=ppt/slides/slide45.xml><?xml version="1.0" encoding="utf-8"?>
+<file path=ppt/slides/slide41.xml><?xml version="1.0" encoding="utf-8"?>
 <p:sld xmlns:a="http://schemas.openxmlformats.org/drawingml/2006/main" xmlns:r="http://schemas.openxmlformats.org/officeDocument/2006/relationships" xmlns:p="http://schemas.openxmlformats.org/presentationml/2006/main">
   <p:cSld>
     <p:spTree>

</xml_diff>